<commit_message>
TW formatting updates and replaced diagram image.
</commit_message>
<xml_diff>
--- a/images/terraform-cloudera-cdp-architecture-diagram.pptx
+++ b/images/terraform-cloudera-cdp-architecture-diagram.pptx
@@ -11,7 +11,7 @@
   <p:sldIdLst>
     <p:sldId id="256" r:id="rId3"/>
   </p:sldIdLst>
-  <p:sldSz cx="12192000" cy="6858000"/>
+  <p:sldSz cx="16459200" cy="10972800"/>
   <p:notesSz cx="6858000" cy="9144000"/>
   <p:defaultTextStyle>
     <a:defPPr marR="0" lvl="0" algn="l" rtl="0">
@@ -39,7 +39,7 @@
         <a:srgbClr val="000000"/>
       </a:buClr>
       <a:buFont typeface="Arial"/>
-      <a:defRPr sz="1867" b="0" i="0" u="none" strike="noStrike" cap="none">
+      <a:defRPr sz="2688" b="0" i="0" u="none" strike="noStrike" cap="none">
         <a:solidFill>
           <a:srgbClr val="000000"/>
         </a:solidFill>
@@ -63,7 +63,7 @@
         <a:srgbClr val="000000"/>
       </a:buClr>
       <a:buFont typeface="Arial"/>
-      <a:defRPr sz="1867" b="0" i="0" u="none" strike="noStrike" cap="none">
+      <a:defRPr sz="2688" b="0" i="0" u="none" strike="noStrike" cap="none">
         <a:solidFill>
           <a:srgbClr val="000000"/>
         </a:solidFill>
@@ -87,7 +87,7 @@
         <a:srgbClr val="000000"/>
       </a:buClr>
       <a:buFont typeface="Arial"/>
-      <a:defRPr sz="1867" b="0" i="0" u="none" strike="noStrike" cap="none">
+      <a:defRPr sz="2688" b="0" i="0" u="none" strike="noStrike" cap="none">
         <a:solidFill>
           <a:srgbClr val="000000"/>
         </a:solidFill>
@@ -111,7 +111,7 @@
         <a:srgbClr val="000000"/>
       </a:buClr>
       <a:buFont typeface="Arial"/>
-      <a:defRPr sz="1867" b="0" i="0" u="none" strike="noStrike" cap="none">
+      <a:defRPr sz="2688" b="0" i="0" u="none" strike="noStrike" cap="none">
         <a:solidFill>
           <a:srgbClr val="000000"/>
         </a:solidFill>
@@ -135,7 +135,7 @@
         <a:srgbClr val="000000"/>
       </a:buClr>
       <a:buFont typeface="Arial"/>
-      <a:defRPr sz="1867" b="0" i="0" u="none" strike="noStrike" cap="none">
+      <a:defRPr sz="2688" b="0" i="0" u="none" strike="noStrike" cap="none">
         <a:solidFill>
           <a:srgbClr val="000000"/>
         </a:solidFill>
@@ -159,7 +159,7 @@
         <a:srgbClr val="000000"/>
       </a:buClr>
       <a:buFont typeface="Arial"/>
-      <a:defRPr sz="1867" b="0" i="0" u="none" strike="noStrike" cap="none">
+      <a:defRPr sz="2688" b="0" i="0" u="none" strike="noStrike" cap="none">
         <a:solidFill>
           <a:srgbClr val="000000"/>
         </a:solidFill>
@@ -183,7 +183,7 @@
         <a:srgbClr val="000000"/>
       </a:buClr>
       <a:buFont typeface="Arial"/>
-      <a:defRPr sz="1867" b="0" i="0" u="none" strike="noStrike" cap="none">
+      <a:defRPr sz="2688" b="0" i="0" u="none" strike="noStrike" cap="none">
         <a:solidFill>
           <a:srgbClr val="000000"/>
         </a:solidFill>
@@ -207,7 +207,7 @@
         <a:srgbClr val="000000"/>
       </a:buClr>
       <a:buFont typeface="Arial"/>
-      <a:defRPr sz="1867" b="0" i="0" u="none" strike="noStrike" cap="none">
+      <a:defRPr sz="2688" b="0" i="0" u="none" strike="noStrike" cap="none">
         <a:solidFill>
           <a:srgbClr val="000000"/>
         </a:solidFill>
@@ -231,7 +231,7 @@
         <a:srgbClr val="000000"/>
       </a:buClr>
       <a:buFont typeface="Arial"/>
-      <a:defRPr sz="1867" b="0" i="0" u="none" strike="noStrike" cap="none">
+      <a:defRPr sz="2688" b="0" i="0" u="none" strike="noStrike" cap="none">
         <a:solidFill>
           <a:srgbClr val="000000"/>
         </a:solidFill>
@@ -245,12 +245,12 @@
   <p:extLst>
     <p:ext uri="{EFAFB233-063F-42B5-8137-9DF3F51BA10A}">
       <p15:sldGuideLst xmlns:p15="http://schemas.microsoft.com/office/powerpoint/2012/main">
-        <p15:guide id="1" orient="horz" pos="2160" userDrawn="1">
+        <p15:guide id="1" orient="horz" pos="3456" userDrawn="1">
           <p15:clr>
             <a:srgbClr val="747775"/>
           </p15:clr>
         </p15:guide>
-        <p15:guide id="2" pos="3840" userDrawn="1">
+        <p15:guide id="2" pos="5184" userDrawn="1">
           <p15:clr>
             <a:srgbClr val="747775"/>
           </p15:clr>
@@ -295,8 +295,8 @@
         </p:nvSpPr>
         <p:spPr>
           <a:xfrm>
-            <a:off x="381000" y="685800"/>
-            <a:ext cx="6096000" cy="3429000"/>
+            <a:off x="857250" y="685800"/>
+            <a:ext cx="5143500" cy="3429000"/>
           </a:xfrm>
           <a:custGeom>
             <a:avLst/>
@@ -496,7 +496,7 @@
         <a:srgbClr val="000000"/>
       </a:buClr>
       <a:buFont typeface="Arial"/>
-      <a:defRPr sz="1867" b="0" i="0" u="none" strike="noStrike" cap="none">
+      <a:defRPr sz="2688" b="0" i="0" u="none" strike="noStrike" cap="none">
         <a:solidFill>
           <a:srgbClr val="000000"/>
         </a:solidFill>
@@ -520,7 +520,7 @@
         <a:srgbClr val="000000"/>
       </a:buClr>
       <a:buFont typeface="Arial"/>
-      <a:defRPr sz="1867" b="0" i="0" u="none" strike="noStrike" cap="none">
+      <a:defRPr sz="2688" b="0" i="0" u="none" strike="noStrike" cap="none">
         <a:solidFill>
           <a:srgbClr val="000000"/>
         </a:solidFill>
@@ -544,7 +544,7 @@
         <a:srgbClr val="000000"/>
       </a:buClr>
       <a:buFont typeface="Arial"/>
-      <a:defRPr sz="1867" b="0" i="0" u="none" strike="noStrike" cap="none">
+      <a:defRPr sz="2688" b="0" i="0" u="none" strike="noStrike" cap="none">
         <a:solidFill>
           <a:srgbClr val="000000"/>
         </a:solidFill>
@@ -568,7 +568,7 @@
         <a:srgbClr val="000000"/>
       </a:buClr>
       <a:buFont typeface="Arial"/>
-      <a:defRPr sz="1867" b="0" i="0" u="none" strike="noStrike" cap="none">
+      <a:defRPr sz="2688" b="0" i="0" u="none" strike="noStrike" cap="none">
         <a:solidFill>
           <a:srgbClr val="000000"/>
         </a:solidFill>
@@ -592,7 +592,7 @@
         <a:srgbClr val="000000"/>
       </a:buClr>
       <a:buFont typeface="Arial"/>
-      <a:defRPr sz="1867" b="0" i="0" u="none" strike="noStrike" cap="none">
+      <a:defRPr sz="2688" b="0" i="0" u="none" strike="noStrike" cap="none">
         <a:solidFill>
           <a:srgbClr val="000000"/>
         </a:solidFill>
@@ -616,7 +616,7 @@
         <a:srgbClr val="000000"/>
       </a:buClr>
       <a:buFont typeface="Arial"/>
-      <a:defRPr sz="1867" b="0" i="0" u="none" strike="noStrike" cap="none">
+      <a:defRPr sz="2688" b="0" i="0" u="none" strike="noStrike" cap="none">
         <a:solidFill>
           <a:srgbClr val="000000"/>
         </a:solidFill>
@@ -640,7 +640,7 @@
         <a:srgbClr val="000000"/>
       </a:buClr>
       <a:buFont typeface="Arial"/>
-      <a:defRPr sz="1867" b="0" i="0" u="none" strike="noStrike" cap="none">
+      <a:defRPr sz="2688" b="0" i="0" u="none" strike="noStrike" cap="none">
         <a:solidFill>
           <a:srgbClr val="000000"/>
         </a:solidFill>
@@ -664,7 +664,7 @@
         <a:srgbClr val="000000"/>
       </a:buClr>
       <a:buFont typeface="Arial"/>
-      <a:defRPr sz="1867" b="0" i="0" u="none" strike="noStrike" cap="none">
+      <a:defRPr sz="2688" b="0" i="0" u="none" strike="noStrike" cap="none">
         <a:solidFill>
           <a:srgbClr val="000000"/>
         </a:solidFill>
@@ -688,7 +688,7 @@
         <a:srgbClr val="000000"/>
       </a:buClr>
       <a:buFont typeface="Arial"/>
-      <a:defRPr sz="1867" b="0" i="0" u="none" strike="noStrike" cap="none">
+      <a:defRPr sz="2688" b="0" i="0" u="none" strike="noStrike" cap="none">
         <a:solidFill>
           <a:srgbClr val="000000"/>
         </a:solidFill>
@@ -731,8 +731,8 @@
         </p:nvSpPr>
         <p:spPr>
           <a:xfrm>
-            <a:off x="685800" y="1143000"/>
-            <a:ext cx="5486400" cy="3086100"/>
+            <a:off x="1114425" y="1143000"/>
+            <a:ext cx="4629150" cy="3086100"/>
           </a:xfrm>
           <a:custGeom>
             <a:avLst/>
@@ -895,8 +895,8 @@
         </p:nvSpPr>
         <p:spPr>
           <a:xfrm>
-            <a:off x="415611" y="992767"/>
-            <a:ext cx="11360800" cy="2736800"/>
+            <a:off x="561075" y="1588427"/>
+            <a:ext cx="15337080" cy="4378880"/>
           </a:xfrm>
           <a:prstGeom prst="rect">
             <a:avLst/>
@@ -1024,8 +1024,8 @@
         </p:nvSpPr>
         <p:spPr>
           <a:xfrm>
-            <a:off x="415600" y="3778833"/>
-            <a:ext cx="11360800" cy="1056800"/>
+            <a:off x="561060" y="6046133"/>
+            <a:ext cx="15337080" cy="1690880"/>
           </a:xfrm>
           <a:prstGeom prst="rect">
             <a:avLst/>
@@ -1180,8 +1180,8 @@
         </p:nvSpPr>
         <p:spPr>
           <a:xfrm>
-            <a:off x="11296612" y="6217623"/>
-            <a:ext cx="731600" cy="524800"/>
+            <a:off x="15250426" y="9948197"/>
+            <a:ext cx="987660" cy="839680"/>
           </a:xfrm>
           <a:prstGeom prst="rect">
             <a:avLst/>
@@ -1276,8 +1276,8 @@
         </p:nvSpPr>
         <p:spPr>
           <a:xfrm>
-            <a:off x="415600" y="1474833"/>
-            <a:ext cx="11360800" cy="2618000"/>
+            <a:off x="561060" y="2359733"/>
+            <a:ext cx="15337080" cy="4188800"/>
           </a:xfrm>
           <a:prstGeom prst="rect">
             <a:avLst/>
@@ -1407,8 +1407,8 @@
         </p:nvSpPr>
         <p:spPr>
           <a:xfrm>
-            <a:off x="415600" y="4202967"/>
-            <a:ext cx="11360800" cy="1734400"/>
+            <a:off x="561060" y="6724747"/>
+            <a:ext cx="15337080" cy="2775040"/>
           </a:xfrm>
           <a:prstGeom prst="rect">
             <a:avLst/>
@@ -1536,8 +1536,8 @@
         </p:nvSpPr>
         <p:spPr>
           <a:xfrm>
-            <a:off x="11296612" y="6217623"/>
-            <a:ext cx="731600" cy="524800"/>
+            <a:off x="15250426" y="9948197"/>
+            <a:ext cx="987660" cy="839680"/>
           </a:xfrm>
           <a:prstGeom prst="rect">
             <a:avLst/>
@@ -1632,8 +1632,8 @@
         </p:nvSpPr>
         <p:spPr>
           <a:xfrm>
-            <a:off x="11296612" y="6217623"/>
-            <a:ext cx="731600" cy="524800"/>
+            <a:off x="15250426" y="9948197"/>
+            <a:ext cx="987660" cy="839680"/>
           </a:xfrm>
           <a:prstGeom prst="rect">
             <a:avLst/>
@@ -1728,8 +1728,8 @@
         </p:nvSpPr>
         <p:spPr>
           <a:xfrm>
-            <a:off x="838201" y="6356351"/>
-            <a:ext cx="2743200" cy="365125"/>
+            <a:off x="1131571" y="10170162"/>
+            <a:ext cx="3703320" cy="584200"/>
           </a:xfrm>
           <a:prstGeom prst="rect">
             <a:avLst/>
@@ -1861,8 +1861,8 @@
         </p:nvSpPr>
         <p:spPr>
           <a:xfrm>
-            <a:off x="4038601" y="6356351"/>
-            <a:ext cx="4114800" cy="365125"/>
+            <a:off x="5452111" y="10170162"/>
+            <a:ext cx="5554980" cy="584200"/>
           </a:xfrm>
           <a:prstGeom prst="rect">
             <a:avLst/>
@@ -1994,8 +1994,8 @@
         </p:nvSpPr>
         <p:spPr>
           <a:xfrm>
-            <a:off x="8610601" y="6356351"/>
-            <a:ext cx="2743200" cy="365125"/>
+            <a:off x="11624311" y="10170162"/>
+            <a:ext cx="3703320" cy="584200"/>
           </a:xfrm>
           <a:prstGeom prst="rect">
             <a:avLst/>
@@ -2121,8 +2121,8 @@
         </p:nvSpPr>
         <p:spPr>
           <a:xfrm>
-            <a:off x="914400" y="1122363"/>
-            <a:ext cx="10363200" cy="2387600"/>
+            <a:off x="1234440" y="1795781"/>
+            <a:ext cx="13990320" cy="3820160"/>
           </a:xfrm>
           <a:prstGeom prst="rect">
             <a:avLst/>
@@ -2261,8 +2261,8 @@
         </p:nvSpPr>
         <p:spPr>
           <a:xfrm>
-            <a:off x="1524000" y="3602040"/>
-            <a:ext cx="9144000" cy="1655761"/>
+            <a:off x="2057400" y="5763265"/>
+            <a:ext cx="12344400" cy="2649218"/>
           </a:xfrm>
           <a:prstGeom prst="rect">
             <a:avLst/>
@@ -2448,8 +2448,8 @@
         </p:nvSpPr>
         <p:spPr>
           <a:xfrm>
-            <a:off x="838201" y="6356351"/>
-            <a:ext cx="2743200" cy="365125"/>
+            <a:off x="1131571" y="10170162"/>
+            <a:ext cx="3703320" cy="584200"/>
           </a:xfrm>
           <a:prstGeom prst="rect">
             <a:avLst/>
@@ -2581,8 +2581,8 @@
         </p:nvSpPr>
         <p:spPr>
           <a:xfrm>
-            <a:off x="4038601" y="6356351"/>
-            <a:ext cx="4114800" cy="365125"/>
+            <a:off x="5452111" y="10170162"/>
+            <a:ext cx="5554980" cy="584200"/>
           </a:xfrm>
           <a:prstGeom prst="rect">
             <a:avLst/>
@@ -2714,8 +2714,8 @@
         </p:nvSpPr>
         <p:spPr>
           <a:xfrm>
-            <a:off x="8610601" y="6356351"/>
-            <a:ext cx="2743200" cy="365125"/>
+            <a:off x="11624311" y="10170162"/>
+            <a:ext cx="3703320" cy="584200"/>
           </a:xfrm>
           <a:prstGeom prst="rect">
             <a:avLst/>
@@ -2841,8 +2841,8 @@
         </p:nvSpPr>
         <p:spPr>
           <a:xfrm>
-            <a:off x="838201" y="365127"/>
-            <a:ext cx="10515600" cy="1325563"/>
+            <a:off x="1131571" y="584204"/>
+            <a:ext cx="14196060" cy="2120901"/>
           </a:xfrm>
           <a:prstGeom prst="rect">
             <a:avLst/>
@@ -2980,8 +2980,8 @@
         </p:nvSpPr>
         <p:spPr>
           <a:xfrm>
-            <a:off x="838201" y="1825625"/>
-            <a:ext cx="10515600" cy="4351339"/>
+            <a:off x="1131571" y="2921001"/>
+            <a:ext cx="14196060" cy="6962142"/>
           </a:xfrm>
           <a:prstGeom prst="rect">
             <a:avLst/>
@@ -3167,8 +3167,8 @@
         </p:nvSpPr>
         <p:spPr>
           <a:xfrm>
-            <a:off x="838201" y="6356351"/>
-            <a:ext cx="2743200" cy="365125"/>
+            <a:off x="1131571" y="10170162"/>
+            <a:ext cx="3703320" cy="584200"/>
           </a:xfrm>
           <a:prstGeom prst="rect">
             <a:avLst/>
@@ -3300,8 +3300,8 @@
         </p:nvSpPr>
         <p:spPr>
           <a:xfrm>
-            <a:off x="4038601" y="6356351"/>
-            <a:ext cx="4114800" cy="365125"/>
+            <a:off x="5452111" y="10170162"/>
+            <a:ext cx="5554980" cy="584200"/>
           </a:xfrm>
           <a:prstGeom prst="rect">
             <a:avLst/>
@@ -3433,8 +3433,8 @@
         </p:nvSpPr>
         <p:spPr>
           <a:xfrm>
-            <a:off x="8610601" y="6356351"/>
-            <a:ext cx="2743200" cy="365125"/>
+            <a:off x="11624311" y="10170162"/>
+            <a:ext cx="3703320" cy="584200"/>
           </a:xfrm>
           <a:prstGeom prst="rect">
             <a:avLst/>
@@ -3560,8 +3560,8 @@
         </p:nvSpPr>
         <p:spPr>
           <a:xfrm>
-            <a:off x="831852" y="1709744"/>
-            <a:ext cx="10515600" cy="2852737"/>
+            <a:off x="1123000" y="2735591"/>
+            <a:ext cx="14196060" cy="4564379"/>
           </a:xfrm>
           <a:prstGeom prst="rect">
             <a:avLst/>
@@ -3700,8 +3700,8 @@
         </p:nvSpPr>
         <p:spPr>
           <a:xfrm>
-            <a:off x="831852" y="4589464"/>
-            <a:ext cx="10515600" cy="1500187"/>
+            <a:off x="1123000" y="7343143"/>
+            <a:ext cx="14196060" cy="2400299"/>
           </a:xfrm>
           <a:prstGeom prst="rect">
             <a:avLst/>
@@ -3923,8 +3923,8 @@
         </p:nvSpPr>
         <p:spPr>
           <a:xfrm>
-            <a:off x="838201" y="6356351"/>
-            <a:ext cx="2743200" cy="365125"/>
+            <a:off x="1131571" y="10170162"/>
+            <a:ext cx="3703320" cy="584200"/>
           </a:xfrm>
           <a:prstGeom prst="rect">
             <a:avLst/>
@@ -4056,8 +4056,8 @@
         </p:nvSpPr>
         <p:spPr>
           <a:xfrm>
-            <a:off x="4038601" y="6356351"/>
-            <a:ext cx="4114800" cy="365125"/>
+            <a:off x="5452111" y="10170162"/>
+            <a:ext cx="5554980" cy="584200"/>
           </a:xfrm>
           <a:prstGeom prst="rect">
             <a:avLst/>
@@ -4189,8 +4189,8 @@
         </p:nvSpPr>
         <p:spPr>
           <a:xfrm>
-            <a:off x="8610601" y="6356351"/>
-            <a:ext cx="2743200" cy="365125"/>
+            <a:off x="11624311" y="10170162"/>
+            <a:ext cx="3703320" cy="584200"/>
           </a:xfrm>
           <a:prstGeom prst="rect">
             <a:avLst/>
@@ -4316,8 +4316,8 @@
         </p:nvSpPr>
         <p:spPr>
           <a:xfrm>
-            <a:off x="838201" y="365127"/>
-            <a:ext cx="10515600" cy="1325563"/>
+            <a:off x="1131571" y="584204"/>
+            <a:ext cx="14196060" cy="2120901"/>
           </a:xfrm>
           <a:prstGeom prst="rect">
             <a:avLst/>
@@ -4455,8 +4455,8 @@
         </p:nvSpPr>
         <p:spPr>
           <a:xfrm>
-            <a:off x="838201" y="1825625"/>
-            <a:ext cx="5181600" cy="4351339"/>
+            <a:off x="1131571" y="2921001"/>
+            <a:ext cx="6995160" cy="6962142"/>
           </a:xfrm>
           <a:prstGeom prst="rect">
             <a:avLst/>
@@ -4642,8 +4642,8 @@
         </p:nvSpPr>
         <p:spPr>
           <a:xfrm>
-            <a:off x="6172201" y="1825625"/>
-            <a:ext cx="5181600" cy="4351339"/>
+            <a:off x="8332471" y="2921001"/>
+            <a:ext cx="6995160" cy="6962142"/>
           </a:xfrm>
           <a:prstGeom prst="rect">
             <a:avLst/>
@@ -4829,8 +4829,8 @@
         </p:nvSpPr>
         <p:spPr>
           <a:xfrm>
-            <a:off x="838201" y="6356351"/>
-            <a:ext cx="2743200" cy="365125"/>
+            <a:off x="1131571" y="10170162"/>
+            <a:ext cx="3703320" cy="584200"/>
           </a:xfrm>
           <a:prstGeom prst="rect">
             <a:avLst/>
@@ -4962,8 +4962,8 @@
         </p:nvSpPr>
         <p:spPr>
           <a:xfrm>
-            <a:off x="4038601" y="6356351"/>
-            <a:ext cx="4114800" cy="365125"/>
+            <a:off x="5452111" y="10170162"/>
+            <a:ext cx="5554980" cy="584200"/>
           </a:xfrm>
           <a:prstGeom prst="rect">
             <a:avLst/>
@@ -5095,8 +5095,8 @@
         </p:nvSpPr>
         <p:spPr>
           <a:xfrm>
-            <a:off x="8610601" y="6356351"/>
-            <a:ext cx="2743200" cy="365125"/>
+            <a:off x="11624311" y="10170162"/>
+            <a:ext cx="3703320" cy="584200"/>
           </a:xfrm>
           <a:prstGeom prst="rect">
             <a:avLst/>
@@ -5222,8 +5222,8 @@
         </p:nvSpPr>
         <p:spPr>
           <a:xfrm>
-            <a:off x="839789" y="365127"/>
-            <a:ext cx="10515600" cy="1325563"/>
+            <a:off x="1133715" y="584204"/>
+            <a:ext cx="14196060" cy="2120901"/>
           </a:xfrm>
           <a:prstGeom prst="rect">
             <a:avLst/>
@@ -5361,8 +5361,8 @@
         </p:nvSpPr>
         <p:spPr>
           <a:xfrm>
-            <a:off x="839789" y="1681163"/>
-            <a:ext cx="5157787" cy="823912"/>
+            <a:off x="1133716" y="2689861"/>
+            <a:ext cx="6963012" cy="1318259"/>
           </a:xfrm>
           <a:prstGeom prst="rect">
             <a:avLst/>
@@ -5548,8 +5548,8 @@
         </p:nvSpPr>
         <p:spPr>
           <a:xfrm>
-            <a:off x="839789" y="2505077"/>
-            <a:ext cx="5157787" cy="3684588"/>
+            <a:off x="1133716" y="4008123"/>
+            <a:ext cx="6963012" cy="5895341"/>
           </a:xfrm>
           <a:prstGeom prst="rect">
             <a:avLst/>
@@ -5735,8 +5735,8 @@
         </p:nvSpPr>
         <p:spPr>
           <a:xfrm>
-            <a:off x="6172205" y="1681163"/>
-            <a:ext cx="5183188" cy="823912"/>
+            <a:off x="8332477" y="2689861"/>
+            <a:ext cx="6997304" cy="1318259"/>
           </a:xfrm>
           <a:prstGeom prst="rect">
             <a:avLst/>
@@ -5922,8 +5922,8 @@
         </p:nvSpPr>
         <p:spPr>
           <a:xfrm>
-            <a:off x="6172205" y="2505077"/>
-            <a:ext cx="5183188" cy="3684588"/>
+            <a:off x="8332477" y="4008123"/>
+            <a:ext cx="6997304" cy="5895341"/>
           </a:xfrm>
           <a:prstGeom prst="rect">
             <a:avLst/>
@@ -6109,8 +6109,8 @@
         </p:nvSpPr>
         <p:spPr>
           <a:xfrm>
-            <a:off x="838201" y="6356351"/>
-            <a:ext cx="2743200" cy="365125"/>
+            <a:off x="1131571" y="10170162"/>
+            <a:ext cx="3703320" cy="584200"/>
           </a:xfrm>
           <a:prstGeom prst="rect">
             <a:avLst/>
@@ -6242,8 +6242,8 @@
         </p:nvSpPr>
         <p:spPr>
           <a:xfrm>
-            <a:off x="4038601" y="6356351"/>
-            <a:ext cx="4114800" cy="365125"/>
+            <a:off x="5452111" y="10170162"/>
+            <a:ext cx="5554980" cy="584200"/>
           </a:xfrm>
           <a:prstGeom prst="rect">
             <a:avLst/>
@@ -6375,8 +6375,8 @@
         </p:nvSpPr>
         <p:spPr>
           <a:xfrm>
-            <a:off x="8610601" y="6356351"/>
-            <a:ext cx="2743200" cy="365125"/>
+            <a:off x="11624311" y="10170162"/>
+            <a:ext cx="3703320" cy="584200"/>
           </a:xfrm>
           <a:prstGeom prst="rect">
             <a:avLst/>
@@ -6502,8 +6502,8 @@
         </p:nvSpPr>
         <p:spPr>
           <a:xfrm>
-            <a:off x="838201" y="365127"/>
-            <a:ext cx="10515600" cy="1325563"/>
+            <a:off x="1131571" y="584204"/>
+            <a:ext cx="14196060" cy="2120901"/>
           </a:xfrm>
           <a:prstGeom prst="rect">
             <a:avLst/>
@@ -6641,8 +6641,8 @@
         </p:nvSpPr>
         <p:spPr>
           <a:xfrm>
-            <a:off x="838201" y="6356351"/>
-            <a:ext cx="2743200" cy="365125"/>
+            <a:off x="1131571" y="10170162"/>
+            <a:ext cx="3703320" cy="584200"/>
           </a:xfrm>
           <a:prstGeom prst="rect">
             <a:avLst/>
@@ -6774,8 +6774,8 @@
         </p:nvSpPr>
         <p:spPr>
           <a:xfrm>
-            <a:off x="4038601" y="6356351"/>
-            <a:ext cx="4114800" cy="365125"/>
+            <a:off x="5452111" y="10170162"/>
+            <a:ext cx="5554980" cy="584200"/>
           </a:xfrm>
           <a:prstGeom prst="rect">
             <a:avLst/>
@@ -6907,8 +6907,8 @@
         </p:nvSpPr>
         <p:spPr>
           <a:xfrm>
-            <a:off x="8610601" y="6356351"/>
-            <a:ext cx="2743200" cy="365125"/>
+            <a:off x="11624311" y="10170162"/>
+            <a:ext cx="3703320" cy="584200"/>
           </a:xfrm>
           <a:prstGeom prst="rect">
             <a:avLst/>
@@ -7034,8 +7034,8 @@
         </p:nvSpPr>
         <p:spPr>
           <a:xfrm>
-            <a:off x="839789" y="457200"/>
-            <a:ext cx="3932239" cy="1600200"/>
+            <a:off x="1133716" y="731520"/>
+            <a:ext cx="5308523" cy="2560320"/>
           </a:xfrm>
           <a:prstGeom prst="rect">
             <a:avLst/>
@@ -7174,8 +7174,8 @@
         </p:nvSpPr>
         <p:spPr>
           <a:xfrm>
-            <a:off x="5183189" y="987430"/>
-            <a:ext cx="6172201" cy="4873625"/>
+            <a:off x="6997306" y="1579889"/>
+            <a:ext cx="8332471" cy="7797800"/>
           </a:xfrm>
           <a:prstGeom prst="rect">
             <a:avLst/>
@@ -7361,8 +7361,8 @@
         </p:nvSpPr>
         <p:spPr>
           <a:xfrm>
-            <a:off x="839789" y="2057403"/>
-            <a:ext cx="3932239" cy="3811588"/>
+            <a:off x="1133716" y="3291845"/>
+            <a:ext cx="5308523" cy="6098541"/>
           </a:xfrm>
           <a:prstGeom prst="rect">
             <a:avLst/>
@@ -7548,8 +7548,8 @@
         </p:nvSpPr>
         <p:spPr>
           <a:xfrm>
-            <a:off x="838201" y="6356351"/>
-            <a:ext cx="2743200" cy="365125"/>
+            <a:off x="1131571" y="10170162"/>
+            <a:ext cx="3703320" cy="584200"/>
           </a:xfrm>
           <a:prstGeom prst="rect">
             <a:avLst/>
@@ -7681,8 +7681,8 @@
         </p:nvSpPr>
         <p:spPr>
           <a:xfrm>
-            <a:off x="4038601" y="6356351"/>
-            <a:ext cx="4114800" cy="365125"/>
+            <a:off x="5452111" y="10170162"/>
+            <a:ext cx="5554980" cy="584200"/>
           </a:xfrm>
           <a:prstGeom prst="rect">
             <a:avLst/>
@@ -7814,8 +7814,8 @@
         </p:nvSpPr>
         <p:spPr>
           <a:xfrm>
-            <a:off x="8610601" y="6356351"/>
-            <a:ext cx="2743200" cy="365125"/>
+            <a:off x="11624311" y="10170162"/>
+            <a:ext cx="3703320" cy="584200"/>
           </a:xfrm>
           <a:prstGeom prst="rect">
             <a:avLst/>
@@ -7941,8 +7941,8 @@
         </p:nvSpPr>
         <p:spPr>
           <a:xfrm>
-            <a:off x="415600" y="2867800"/>
-            <a:ext cx="11360800" cy="1122400"/>
+            <a:off x="561060" y="4588480"/>
+            <a:ext cx="15337080" cy="1795840"/>
           </a:xfrm>
           <a:prstGeom prst="rect">
             <a:avLst/>
@@ -8070,8 +8070,8 @@
         </p:nvSpPr>
         <p:spPr>
           <a:xfrm>
-            <a:off x="11296612" y="6217623"/>
-            <a:ext cx="731600" cy="524800"/>
+            <a:off x="15250426" y="9948197"/>
+            <a:ext cx="987660" cy="839680"/>
           </a:xfrm>
           <a:prstGeom prst="rect">
             <a:avLst/>
@@ -8166,8 +8166,8 @@
         </p:nvSpPr>
         <p:spPr>
           <a:xfrm>
-            <a:off x="839789" y="457200"/>
-            <a:ext cx="3932239" cy="1600200"/>
+            <a:off x="1133716" y="731520"/>
+            <a:ext cx="5308523" cy="2560320"/>
           </a:xfrm>
           <a:prstGeom prst="rect">
             <a:avLst/>
@@ -8306,8 +8306,8 @@
         </p:nvSpPr>
         <p:spPr>
           <a:xfrm>
-            <a:off x="5183189" y="987430"/>
-            <a:ext cx="6172201" cy="4873625"/>
+            <a:off x="6997306" y="1579889"/>
+            <a:ext cx="8332471" cy="7797800"/>
           </a:xfrm>
           <a:prstGeom prst="rect">
             <a:avLst/>
@@ -8330,8 +8330,8 @@
         </p:nvSpPr>
         <p:spPr>
           <a:xfrm>
-            <a:off x="839789" y="2057403"/>
-            <a:ext cx="3932239" cy="3811588"/>
+            <a:off x="1133716" y="3291845"/>
+            <a:ext cx="5308523" cy="6098541"/>
           </a:xfrm>
           <a:prstGeom prst="rect">
             <a:avLst/>
@@ -8517,8 +8517,8 @@
         </p:nvSpPr>
         <p:spPr>
           <a:xfrm>
-            <a:off x="838201" y="6356351"/>
-            <a:ext cx="2743200" cy="365125"/>
+            <a:off x="1131571" y="10170162"/>
+            <a:ext cx="3703320" cy="584200"/>
           </a:xfrm>
           <a:prstGeom prst="rect">
             <a:avLst/>
@@ -8650,8 +8650,8 @@
         </p:nvSpPr>
         <p:spPr>
           <a:xfrm>
-            <a:off x="4038601" y="6356351"/>
-            <a:ext cx="4114800" cy="365125"/>
+            <a:off x="5452111" y="10170162"/>
+            <a:ext cx="5554980" cy="584200"/>
           </a:xfrm>
           <a:prstGeom prst="rect">
             <a:avLst/>
@@ -8783,8 +8783,8 @@
         </p:nvSpPr>
         <p:spPr>
           <a:xfrm>
-            <a:off x="8610601" y="6356351"/>
-            <a:ext cx="2743200" cy="365125"/>
+            <a:off x="11624311" y="10170162"/>
+            <a:ext cx="3703320" cy="584200"/>
           </a:xfrm>
           <a:prstGeom prst="rect">
             <a:avLst/>
@@ -8910,8 +8910,8 @@
         </p:nvSpPr>
         <p:spPr>
           <a:xfrm>
-            <a:off x="838201" y="365127"/>
-            <a:ext cx="10515600" cy="1325563"/>
+            <a:off x="1131571" y="584204"/>
+            <a:ext cx="14196060" cy="2120901"/>
           </a:xfrm>
           <a:prstGeom prst="rect">
             <a:avLst/>
@@ -9049,8 +9049,8 @@
         </p:nvSpPr>
         <p:spPr>
           <a:xfrm rot="5400000">
-            <a:off x="3920331" y="-1256504"/>
-            <a:ext cx="4351339" cy="10515600"/>
+            <a:off x="4748530" y="-695956"/>
+            <a:ext cx="6962142" cy="14196060"/>
           </a:xfrm>
           <a:prstGeom prst="rect">
             <a:avLst/>
@@ -9236,8 +9236,8 @@
         </p:nvSpPr>
         <p:spPr>
           <a:xfrm>
-            <a:off x="838201" y="6356351"/>
-            <a:ext cx="2743200" cy="365125"/>
+            <a:off x="1131571" y="10170162"/>
+            <a:ext cx="3703320" cy="584200"/>
           </a:xfrm>
           <a:prstGeom prst="rect">
             <a:avLst/>
@@ -9369,8 +9369,8 @@
         </p:nvSpPr>
         <p:spPr>
           <a:xfrm>
-            <a:off x="4038601" y="6356351"/>
-            <a:ext cx="4114800" cy="365125"/>
+            <a:off x="5452111" y="10170162"/>
+            <a:ext cx="5554980" cy="584200"/>
           </a:xfrm>
           <a:prstGeom prst="rect">
             <a:avLst/>
@@ -9502,8 +9502,8 @@
         </p:nvSpPr>
         <p:spPr>
           <a:xfrm>
-            <a:off x="8610601" y="6356351"/>
-            <a:ext cx="2743200" cy="365125"/>
+            <a:off x="11624311" y="10170162"/>
+            <a:ext cx="3703320" cy="584200"/>
           </a:xfrm>
           <a:prstGeom prst="rect">
             <a:avLst/>
@@ -9629,8 +9629,8 @@
         </p:nvSpPr>
         <p:spPr>
           <a:xfrm rot="5400000">
-            <a:off x="7133434" y="1956597"/>
-            <a:ext cx="5811839" cy="2628900"/>
+            <a:off x="8903657" y="3459168"/>
+            <a:ext cx="9298942" cy="3549015"/>
           </a:xfrm>
           <a:prstGeom prst="rect">
             <a:avLst/>
@@ -9768,8 +9768,8 @@
         </p:nvSpPr>
         <p:spPr>
           <a:xfrm rot="5400000">
-            <a:off x="1799434" y="-596105"/>
-            <a:ext cx="5811839" cy="7734300"/>
+            <a:off x="1702757" y="13020"/>
+            <a:ext cx="9298942" cy="10441305"/>
           </a:xfrm>
           <a:prstGeom prst="rect">
             <a:avLst/>
@@ -9955,8 +9955,8 @@
         </p:nvSpPr>
         <p:spPr>
           <a:xfrm>
-            <a:off x="838201" y="6356351"/>
-            <a:ext cx="2743200" cy="365125"/>
+            <a:off x="1131571" y="10170162"/>
+            <a:ext cx="3703320" cy="584200"/>
           </a:xfrm>
           <a:prstGeom prst="rect">
             <a:avLst/>
@@ -10088,8 +10088,8 @@
         </p:nvSpPr>
         <p:spPr>
           <a:xfrm>
-            <a:off x="4038601" y="6356351"/>
-            <a:ext cx="4114800" cy="365125"/>
+            <a:off x="5452111" y="10170162"/>
+            <a:ext cx="5554980" cy="584200"/>
           </a:xfrm>
           <a:prstGeom prst="rect">
             <a:avLst/>
@@ -10221,8 +10221,8 @@
         </p:nvSpPr>
         <p:spPr>
           <a:xfrm>
-            <a:off x="8610601" y="6356351"/>
-            <a:ext cx="2743200" cy="365125"/>
+            <a:off x="11624311" y="10170162"/>
+            <a:ext cx="3703320" cy="584200"/>
           </a:xfrm>
           <a:prstGeom prst="rect">
             <a:avLst/>
@@ -10348,8 +10348,8 @@
         </p:nvSpPr>
         <p:spPr>
           <a:xfrm>
-            <a:off x="415600" y="593367"/>
-            <a:ext cx="11360800" cy="763600"/>
+            <a:off x="561060" y="949387"/>
+            <a:ext cx="15337080" cy="1221760"/>
           </a:xfrm>
           <a:prstGeom prst="rect">
             <a:avLst/>
@@ -10477,8 +10477,8 @@
         </p:nvSpPr>
         <p:spPr>
           <a:xfrm>
-            <a:off x="415600" y="1536633"/>
-            <a:ext cx="11360800" cy="4555200"/>
+            <a:off x="561060" y="2458613"/>
+            <a:ext cx="15337080" cy="7288320"/>
           </a:xfrm>
           <a:prstGeom prst="rect">
             <a:avLst/>
@@ -10606,8 +10606,8 @@
         </p:nvSpPr>
         <p:spPr>
           <a:xfrm>
-            <a:off x="11296612" y="6217623"/>
-            <a:ext cx="731600" cy="524800"/>
+            <a:off x="15250426" y="9948197"/>
+            <a:ext cx="987660" cy="839680"/>
           </a:xfrm>
           <a:prstGeom prst="rect">
             <a:avLst/>
@@ -10702,8 +10702,8 @@
         </p:nvSpPr>
         <p:spPr>
           <a:xfrm>
-            <a:off x="415600" y="593367"/>
-            <a:ext cx="11360800" cy="763600"/>
+            <a:off x="561060" y="949387"/>
+            <a:ext cx="15337080" cy="1221760"/>
           </a:xfrm>
           <a:prstGeom prst="rect">
             <a:avLst/>
@@ -10831,8 +10831,8 @@
         </p:nvSpPr>
         <p:spPr>
           <a:xfrm>
-            <a:off x="415601" y="1536633"/>
-            <a:ext cx="5333200" cy="4555200"/>
+            <a:off x="561061" y="2458613"/>
+            <a:ext cx="7199820" cy="7288320"/>
           </a:xfrm>
           <a:prstGeom prst="rect">
             <a:avLst/>
@@ -10960,8 +10960,8 @@
         </p:nvSpPr>
         <p:spPr>
           <a:xfrm>
-            <a:off x="6443201" y="1536633"/>
-            <a:ext cx="5333200" cy="4555200"/>
+            <a:off x="8698321" y="2458613"/>
+            <a:ext cx="7199820" cy="7288320"/>
           </a:xfrm>
           <a:prstGeom prst="rect">
             <a:avLst/>
@@ -11089,8 +11089,8 @@
         </p:nvSpPr>
         <p:spPr>
           <a:xfrm>
-            <a:off x="11296612" y="6217623"/>
-            <a:ext cx="731600" cy="524800"/>
+            <a:off x="15250426" y="9948197"/>
+            <a:ext cx="987660" cy="839680"/>
           </a:xfrm>
           <a:prstGeom prst="rect">
             <a:avLst/>
@@ -11185,8 +11185,8 @@
         </p:nvSpPr>
         <p:spPr>
           <a:xfrm>
-            <a:off x="415600" y="593367"/>
-            <a:ext cx="11360800" cy="763600"/>
+            <a:off x="561060" y="949387"/>
+            <a:ext cx="15337080" cy="1221760"/>
           </a:xfrm>
           <a:prstGeom prst="rect">
             <a:avLst/>
@@ -11314,8 +11314,8 @@
         </p:nvSpPr>
         <p:spPr>
           <a:xfrm>
-            <a:off x="11296612" y="6217623"/>
-            <a:ext cx="731600" cy="524800"/>
+            <a:off x="15250426" y="9948197"/>
+            <a:ext cx="987660" cy="839680"/>
           </a:xfrm>
           <a:prstGeom prst="rect">
             <a:avLst/>
@@ -11410,8 +11410,8 @@
         </p:nvSpPr>
         <p:spPr>
           <a:xfrm>
-            <a:off x="415600" y="740800"/>
-            <a:ext cx="3744000" cy="1007600"/>
+            <a:off x="561060" y="1185280"/>
+            <a:ext cx="5054400" cy="1612160"/>
           </a:xfrm>
           <a:prstGeom prst="rect">
             <a:avLst/>
@@ -11539,8 +11539,8 @@
         </p:nvSpPr>
         <p:spPr>
           <a:xfrm>
-            <a:off x="415600" y="1852800"/>
-            <a:ext cx="3744000" cy="4239200"/>
+            <a:off x="561060" y="2964480"/>
+            <a:ext cx="5054400" cy="6782720"/>
           </a:xfrm>
           <a:prstGeom prst="rect">
             <a:avLst/>
@@ -11668,8 +11668,8 @@
         </p:nvSpPr>
         <p:spPr>
           <a:xfrm>
-            <a:off x="11296612" y="6217623"/>
-            <a:ext cx="731600" cy="524800"/>
+            <a:off x="15250426" y="9948197"/>
+            <a:ext cx="987660" cy="839680"/>
           </a:xfrm>
           <a:prstGeom prst="rect">
             <a:avLst/>
@@ -11764,8 +11764,8 @@
         </p:nvSpPr>
         <p:spPr>
           <a:xfrm>
-            <a:off x="653668" y="600200"/>
-            <a:ext cx="8490400" cy="5454400"/>
+            <a:off x="882452" y="960320"/>
+            <a:ext cx="11462040" cy="8727040"/>
           </a:xfrm>
           <a:prstGeom prst="rect">
             <a:avLst/>
@@ -11893,8 +11893,8 @@
         </p:nvSpPr>
         <p:spPr>
           <a:xfrm>
-            <a:off x="11296612" y="6217623"/>
-            <a:ext cx="731600" cy="524800"/>
+            <a:off x="15250426" y="9948197"/>
+            <a:ext cx="987660" cy="839680"/>
           </a:xfrm>
           <a:prstGeom prst="rect">
             <a:avLst/>
@@ -11985,8 +11985,8 @@
         </p:nvSpPr>
         <p:spPr>
           <a:xfrm>
-            <a:off x="6096000" y="-167"/>
-            <a:ext cx="6096000" cy="6858000"/>
+            <a:off x="8229600" y="-267"/>
+            <a:ext cx="8229600" cy="10972800"/>
           </a:xfrm>
           <a:prstGeom prst="rect">
             <a:avLst/>
@@ -12029,8 +12029,8 @@
         </p:nvSpPr>
         <p:spPr>
           <a:xfrm>
-            <a:off x="354000" y="1644233"/>
-            <a:ext cx="5393600" cy="1976400"/>
+            <a:off x="477900" y="2630773"/>
+            <a:ext cx="7281360" cy="3162240"/>
           </a:xfrm>
           <a:prstGeom prst="rect">
             <a:avLst/>
@@ -12158,8 +12158,8 @@
         </p:nvSpPr>
         <p:spPr>
           <a:xfrm>
-            <a:off x="354000" y="3737433"/>
-            <a:ext cx="5393600" cy="1646800"/>
+            <a:off x="477900" y="5979893"/>
+            <a:ext cx="7281360" cy="2634880"/>
           </a:xfrm>
           <a:prstGeom prst="rect">
             <a:avLst/>
@@ -12314,8 +12314,8 @@
         </p:nvSpPr>
         <p:spPr>
           <a:xfrm>
-            <a:off x="6586000" y="965433"/>
-            <a:ext cx="5116000" cy="4926800"/>
+            <a:off x="8891100" y="1544693"/>
+            <a:ext cx="6906600" cy="7882880"/>
           </a:xfrm>
           <a:prstGeom prst="rect">
             <a:avLst/>
@@ -12443,8 +12443,8 @@
         </p:nvSpPr>
         <p:spPr>
           <a:xfrm>
-            <a:off x="11296612" y="6217623"/>
-            <a:ext cx="731600" cy="524800"/>
+            <a:off x="15250426" y="9948197"/>
+            <a:ext cx="987660" cy="839680"/>
           </a:xfrm>
           <a:prstGeom prst="rect">
             <a:avLst/>
@@ -12539,8 +12539,8 @@
         </p:nvSpPr>
         <p:spPr>
           <a:xfrm>
-            <a:off x="415600" y="5640767"/>
-            <a:ext cx="7998400" cy="806800"/>
+            <a:off x="561060" y="9025227"/>
+            <a:ext cx="10797840" cy="1290880"/>
           </a:xfrm>
           <a:prstGeom prst="rect">
             <a:avLst/>
@@ -12583,8 +12583,8 @@
         </p:nvSpPr>
         <p:spPr>
           <a:xfrm>
-            <a:off x="11296612" y="6217623"/>
-            <a:ext cx="731600" cy="524800"/>
+            <a:off x="15250426" y="9948197"/>
+            <a:ext cx="987660" cy="839680"/>
           </a:xfrm>
           <a:prstGeom prst="rect">
             <a:avLst/>
@@ -12687,8 +12687,8 @@
         </p:nvSpPr>
         <p:spPr>
           <a:xfrm>
-            <a:off x="415600" y="593367"/>
-            <a:ext cx="11360800" cy="763600"/>
+            <a:off x="561060" y="949387"/>
+            <a:ext cx="15337080" cy="1221760"/>
           </a:xfrm>
           <a:prstGeom prst="rect">
             <a:avLst/>
@@ -12883,8 +12883,8 @@
         </p:nvSpPr>
         <p:spPr>
           <a:xfrm>
-            <a:off x="415600" y="1536633"/>
-            <a:ext cx="11360800" cy="4555200"/>
+            <a:off x="561060" y="2458613"/>
+            <a:ext cx="15337080" cy="7288320"/>
           </a:xfrm>
           <a:prstGeom prst="rect">
             <a:avLst/>
@@ -13106,8 +13106,8 @@
         </p:nvSpPr>
         <p:spPr>
           <a:xfrm>
-            <a:off x="11296612" y="6217623"/>
-            <a:ext cx="731600" cy="524800"/>
+            <a:off x="15250426" y="9948197"/>
+            <a:ext cx="987660" cy="839680"/>
           </a:xfrm>
           <a:prstGeom prst="rect">
             <a:avLst/>
@@ -13951,8 +13951,8 @@
         </p:nvSpPr>
         <p:spPr>
           <a:xfrm>
-            <a:off x="838201" y="365127"/>
-            <a:ext cx="10515600" cy="1325563"/>
+            <a:off x="1131571" y="584204"/>
+            <a:ext cx="14196060" cy="2120901"/>
           </a:xfrm>
           <a:prstGeom prst="rect">
             <a:avLst/>
@@ -14099,8 +14099,8 @@
         </p:nvSpPr>
         <p:spPr>
           <a:xfrm>
-            <a:off x="838201" y="1825625"/>
-            <a:ext cx="10515600" cy="4351339"/>
+            <a:off x="1131571" y="2921001"/>
+            <a:ext cx="14196060" cy="6962142"/>
           </a:xfrm>
           <a:prstGeom prst="rect">
             <a:avLst/>
@@ -14367,8 +14367,8 @@
         </p:nvSpPr>
         <p:spPr>
           <a:xfrm>
-            <a:off x="838201" y="6356351"/>
-            <a:ext cx="2743200" cy="365125"/>
+            <a:off x="1131571" y="10170162"/>
+            <a:ext cx="3703320" cy="584200"/>
           </a:xfrm>
           <a:prstGeom prst="rect">
             <a:avLst/>
@@ -14572,8 +14572,8 @@
         </p:nvSpPr>
         <p:spPr>
           <a:xfrm>
-            <a:off x="4038601" y="6356351"/>
-            <a:ext cx="4114800" cy="365125"/>
+            <a:off x="5452111" y="10170162"/>
+            <a:ext cx="5554980" cy="584200"/>
           </a:xfrm>
           <a:prstGeom prst="rect">
             <a:avLst/>
@@ -14777,8 +14777,8 @@
         </p:nvSpPr>
         <p:spPr>
           <a:xfrm>
-            <a:off x="8610601" y="6356351"/>
-            <a:ext cx="2743200" cy="365125"/>
+            <a:off x="11624311" y="10170162"/>
+            <a:ext cx="3703320" cy="584200"/>
           </a:xfrm>
           <a:prstGeom prst="rect">
             <a:avLst/>
@@ -15692,7 +15692,7 @@
         </p:blipFill>
         <p:spPr>
           <a:xfrm>
-            <a:off x="182880" y="182880"/>
+            <a:off x="731520" y="731520"/>
             <a:ext cx="381000" cy="381000"/>
           </a:xfrm>
           <a:prstGeom prst="rect">
@@ -15714,8 +15714,8 @@
         </p:nvSpPr>
         <p:spPr>
           <a:xfrm>
-            <a:off x="182880" y="182880"/>
-            <a:ext cx="11201400" cy="6126480"/>
+            <a:off x="731520" y="731520"/>
+            <a:ext cx="11612880" cy="6583680"/>
           </a:xfrm>
           <a:prstGeom prst="rect">
             <a:avLst/>
@@ -15762,8 +15762,8 @@
         </p:nvSpPr>
         <p:spPr>
           <a:xfrm>
-            <a:off x="1554480" y="457200"/>
-            <a:ext cx="2377440" cy="5669280"/>
+            <a:off x="2103120" y="1005840"/>
+            <a:ext cx="2377440" cy="6126480"/>
           </a:xfrm>
           <a:prstGeom prst="rect">
             <a:avLst/>
@@ -15810,8 +15810,8 @@
         </p:nvSpPr>
         <p:spPr>
           <a:xfrm>
-            <a:off x="640080" y="822960"/>
-            <a:ext cx="9601200" cy="5212080"/>
+            <a:off x="1188720" y="1371600"/>
+            <a:ext cx="9966960" cy="5669280"/>
           </a:xfrm>
           <a:prstGeom prst="rect">
             <a:avLst/>
@@ -15872,7 +15872,7 @@
         </p:blipFill>
         <p:spPr>
           <a:xfrm>
-            <a:off x="640080" y="822960"/>
+            <a:off x="1188720" y="1371600"/>
             <a:ext cx="381000" cy="381000"/>
           </a:xfrm>
           <a:prstGeom prst="rect">
@@ -15894,8 +15894,8 @@
         </p:nvSpPr>
         <p:spPr>
           <a:xfrm>
-            <a:off x="4023360" y="457200"/>
-            <a:ext cx="2377440" cy="5669280"/>
+            <a:off x="4572000" y="1005840"/>
+            <a:ext cx="2377440" cy="6126480"/>
           </a:xfrm>
           <a:prstGeom prst="rect">
             <a:avLst/>
@@ -15928,355 +15928,6 @@
           </a:p>
         </p:txBody>
       </p:sp>
-      <p:sp>
-        <p:nvSpPr>
-          <p:cNvPr id="75" name="Rectangle 74">
-            <a:extLst>
-              <a:ext uri="{FF2B5EF4-FFF2-40B4-BE49-F238E27FC236}">
-                <a16:creationId xmlns:a16="http://schemas.microsoft.com/office/drawing/2014/main" id="{5ACE92BA-9F0A-44E0-8498-8A23464182E3}"/>
-              </a:ext>
-            </a:extLst>
-          </p:cNvPr>
-          <p:cNvSpPr/>
-          <p:nvPr/>
-        </p:nvSpPr>
-        <p:spPr>
-          <a:xfrm>
-            <a:off x="7772400" y="457200"/>
-            <a:ext cx="2377440" cy="5669280"/>
-          </a:xfrm>
-          <a:prstGeom prst="rect">
-            <a:avLst/>
-          </a:prstGeom>
-          <a:noFill/>
-          <a:ln w="15875" cap="flat" cmpd="sng" algn="ctr">
-            <a:solidFill>
-              <a:srgbClr val="00A4A6"/>
-            </a:solidFill>
-            <a:prstDash val="dash"/>
-            <a:miter lim="800000"/>
-          </a:ln>
-          <a:effectLst/>
-        </p:spPr>
-        <p:txBody>
-          <a:bodyPr tIns="91440"/>
-          <a:lstStyle/>
-          <a:p>
-            <a:pPr algn="ctr" defTabSz="914377">
-              <a:buClrTx/>
-              <a:defRPr/>
-            </a:pPr>
-            <a:r>
-              <a:rPr lang="en-US" sz="1200" kern="1200" dirty="0">
-                <a:ea typeface="+mn-ea"/>
-                <a:cs typeface="Arial" panose="020B0604020202020204" pitchFamily="34" charset="0"/>
-              </a:rPr>
-              <a:t>Availability Zone 3</a:t>
-            </a:r>
-          </a:p>
-        </p:txBody>
-      </p:sp>
-      <p:grpSp>
-        <p:nvGrpSpPr>
-          <p:cNvPr id="6" name="Group 5">
-            <a:extLst>
-              <a:ext uri="{FF2B5EF4-FFF2-40B4-BE49-F238E27FC236}">
-                <a16:creationId xmlns:a16="http://schemas.microsoft.com/office/drawing/2014/main" id="{DB5D8C14-3B94-4041-966B-2B5D0789FAB4}"/>
-              </a:ext>
-            </a:extLst>
-          </p:cNvPr>
-          <p:cNvGrpSpPr/>
-          <p:nvPr/>
-        </p:nvGrpSpPr>
-        <p:grpSpPr>
-          <a:xfrm>
-            <a:off x="7863840" y="1188720"/>
-            <a:ext cx="2194560" cy="1188720"/>
-            <a:chOff x="7863840" y="1463040"/>
-            <a:chExt cx="2194560" cy="1188720"/>
-          </a:xfrm>
-        </p:grpSpPr>
-        <p:sp>
-          <p:nvSpPr>
-            <p:cNvPr id="76" name="Rectangle 75">
-              <a:extLst>
-                <a:ext uri="{FF2B5EF4-FFF2-40B4-BE49-F238E27FC236}">
-                  <a16:creationId xmlns:a16="http://schemas.microsoft.com/office/drawing/2014/main" id="{4C806C64-B97A-4746-AF20-03D0FA9BD30C}"/>
-                </a:ext>
-              </a:extLst>
-            </p:cNvPr>
-            <p:cNvSpPr/>
-            <p:nvPr/>
-          </p:nvSpPr>
-          <p:spPr>
-            <a:xfrm>
-              <a:off x="7863840" y="1463040"/>
-              <a:ext cx="2194560" cy="1188720"/>
-            </a:xfrm>
-            <a:prstGeom prst="rect">
-              <a:avLst/>
-            </a:prstGeom>
-            <a:noFill/>
-            <a:ln w="15875" cap="flat" cmpd="sng" algn="ctr">
-              <a:solidFill>
-                <a:srgbClr val="7AA116"/>
-              </a:solidFill>
-              <a:prstDash val="solid"/>
-              <a:miter lim="800000"/>
-            </a:ln>
-            <a:effectLst/>
-          </p:spPr>
-          <p:txBody>
-            <a:bodyPr lIns="502920" tIns="91440" bIns="45720"/>
-            <a:lstStyle/>
-            <a:p>
-              <a:pPr defTabSz="914377">
-                <a:buClrTx/>
-                <a:defRPr/>
-              </a:pPr>
-              <a:r>
-                <a:rPr lang="en-US" sz="1200" kern="1200">
-                  <a:ea typeface="+mn-ea"/>
-                  <a:cs typeface="Arial" panose="020B0604020202020204" pitchFamily="34" charset="0"/>
-                </a:rPr>
-                <a:t>Public subnet</a:t>
-              </a:r>
-            </a:p>
-          </p:txBody>
-        </p:sp>
-        <p:pic>
-          <p:nvPicPr>
-            <p:cNvPr id="77" name="Graphic 76">
-              <a:extLst>
-                <a:ext uri="{FF2B5EF4-FFF2-40B4-BE49-F238E27FC236}">
-                  <a16:creationId xmlns:a16="http://schemas.microsoft.com/office/drawing/2014/main" id="{8F512F4D-328E-49C5-BADC-1684002267CD}"/>
-                </a:ext>
-              </a:extLst>
-            </p:cNvPr>
-            <p:cNvPicPr>
-              <a:picLocks noChangeAspect="1"/>
-            </p:cNvPicPr>
-            <p:nvPr/>
-          </p:nvPicPr>
-          <p:blipFill>
-            <a:blip r:embed="rId7">
-              <a:extLst>
-                <a:ext uri="{96DAC541-7B7A-43D3-8B79-37D633B846F1}">
-                  <asvg:svgBlip xmlns:asvg="http://schemas.microsoft.com/office/drawing/2016/SVG/main" r:embed="rId8"/>
-                </a:ext>
-              </a:extLst>
-            </a:blip>
-            <a:srcRect/>
-            <a:stretch/>
-          </p:blipFill>
-          <p:spPr>
-            <a:xfrm>
-              <a:off x="7863840" y="1463040"/>
-              <a:ext cx="381000" cy="381000"/>
-            </a:xfrm>
-            <a:prstGeom prst="rect">
-              <a:avLst/>
-            </a:prstGeom>
-          </p:spPr>
-        </p:pic>
-        <p:pic>
-          <p:nvPicPr>
-            <p:cNvPr id="78" name="Graphic 77">
-              <a:extLst>
-                <a:ext uri="{FF2B5EF4-FFF2-40B4-BE49-F238E27FC236}">
-                  <a16:creationId xmlns:a16="http://schemas.microsoft.com/office/drawing/2014/main" id="{588CB08E-B254-4B81-831F-1C90224584DB}"/>
-                </a:ext>
-              </a:extLst>
-            </p:cNvPr>
-            <p:cNvPicPr>
-              <a:picLocks noChangeAspect="1"/>
-            </p:cNvPicPr>
-            <p:nvPr/>
-          </p:nvPicPr>
-          <p:blipFill>
-            <a:blip r:embed="rId9">
-              <a:extLst>
-                <a:ext uri="{96DAC541-7B7A-43D3-8B79-37D633B846F1}">
-                  <asvg:svgBlip xmlns:asvg="http://schemas.microsoft.com/office/drawing/2016/SVG/main" r:embed="rId10"/>
-                </a:ext>
-              </a:extLst>
-            </a:blip>
-            <a:stretch>
-              <a:fillRect/>
-            </a:stretch>
-          </p:blipFill>
-          <p:spPr>
-            <a:xfrm>
-              <a:off x="8695944" y="1783080"/>
-              <a:ext cx="457200" cy="457200"/>
-            </a:xfrm>
-            <a:prstGeom prst="rect">
-              <a:avLst/>
-            </a:prstGeom>
-          </p:spPr>
-        </p:pic>
-        <p:sp>
-          <p:nvSpPr>
-            <p:cNvPr id="79" name="TextBox 17">
-              <a:extLst>
-                <a:ext uri="{FF2B5EF4-FFF2-40B4-BE49-F238E27FC236}">
-                  <a16:creationId xmlns:a16="http://schemas.microsoft.com/office/drawing/2014/main" id="{B8C0971F-B147-47C1-AE55-E329BF91D76A}"/>
-                </a:ext>
-              </a:extLst>
-            </p:cNvPr>
-            <p:cNvSpPr txBox="1">
-              <a:spLocks noChangeArrowheads="1"/>
-            </p:cNvSpPr>
-            <p:nvPr/>
-          </p:nvSpPr>
-          <p:spPr bwMode="auto">
-            <a:xfrm>
-              <a:off x="8375904" y="2203704"/>
-              <a:ext cx="1097280" cy="276999"/>
-            </a:xfrm>
-            <a:prstGeom prst="rect">
-              <a:avLst/>
-            </a:prstGeom>
-            <a:noFill/>
-            <a:ln>
-              <a:noFill/>
-            </a:ln>
-            <a:extLst>
-              <a:ext uri="{909E8E84-426E-40DD-AFC4-6F175D3DCCD1}">
-                <a14:hiddenFill xmlns:a14="http://schemas.microsoft.com/office/drawing/2010/main">
-                  <a:solidFill>
-                    <a:srgbClr val="FFFFFF"/>
-                  </a:solidFill>
-                </a14:hiddenFill>
-              </a:ext>
-              <a:ext uri="{91240B29-F687-4F45-9708-019B960494DF}">
-                <a14:hiddenLine xmlns:a14="http://schemas.microsoft.com/office/drawing/2010/main" w="9525">
-                  <a:solidFill>
-                    <a:srgbClr val="000000"/>
-                  </a:solidFill>
-                  <a:miter lim="800000"/>
-                  <a:headEnd/>
-                  <a:tailEnd/>
-                </a14:hiddenLine>
-              </a:ext>
-            </a:extLst>
-          </p:spPr>
-          <p:txBody>
-            <a:bodyPr wrap="square">
-              <a:spAutoFit/>
-            </a:bodyPr>
-            <a:lstStyle>
-              <a:lvl1pPr>
-                <a:defRPr>
-                  <a:solidFill>
-                    <a:schemeClr val="tx1"/>
-                  </a:solidFill>
-                  <a:latin typeface="Calibri" panose="020F0502020204030204" pitchFamily="34" charset="0"/>
-                </a:defRPr>
-              </a:lvl1pPr>
-              <a:lvl2pPr marL="742950" indent="-285750">
-                <a:defRPr>
-                  <a:solidFill>
-                    <a:schemeClr val="tx1"/>
-                  </a:solidFill>
-                  <a:latin typeface="Calibri" panose="020F0502020204030204" pitchFamily="34" charset="0"/>
-                </a:defRPr>
-              </a:lvl2pPr>
-              <a:lvl3pPr marL="1143000" indent="-228600">
-                <a:defRPr>
-                  <a:solidFill>
-                    <a:schemeClr val="tx1"/>
-                  </a:solidFill>
-                  <a:latin typeface="Calibri" panose="020F0502020204030204" pitchFamily="34" charset="0"/>
-                </a:defRPr>
-              </a:lvl3pPr>
-              <a:lvl4pPr marL="1600200" indent="-228600">
-                <a:defRPr>
-                  <a:solidFill>
-                    <a:schemeClr val="tx1"/>
-                  </a:solidFill>
-                  <a:latin typeface="Calibri" panose="020F0502020204030204" pitchFamily="34" charset="0"/>
-                </a:defRPr>
-              </a:lvl4pPr>
-              <a:lvl5pPr marL="2057400" indent="-228600">
-                <a:defRPr>
-                  <a:solidFill>
-                    <a:schemeClr val="tx1"/>
-                  </a:solidFill>
-                  <a:latin typeface="Calibri" panose="020F0502020204030204" pitchFamily="34" charset="0"/>
-                </a:defRPr>
-              </a:lvl5pPr>
-              <a:lvl6pPr marL="2514600" indent="-228600" eaLnBrk="0" fontAlgn="base" hangingPunct="0">
-                <a:spcBef>
-                  <a:spcPct val="0"/>
-                </a:spcBef>
-                <a:spcAft>
-                  <a:spcPct val="0"/>
-                </a:spcAft>
-                <a:defRPr>
-                  <a:solidFill>
-                    <a:schemeClr val="tx1"/>
-                  </a:solidFill>
-                  <a:latin typeface="Calibri" panose="020F0502020204030204" pitchFamily="34" charset="0"/>
-                </a:defRPr>
-              </a:lvl6pPr>
-              <a:lvl7pPr marL="2971800" indent="-228600" eaLnBrk="0" fontAlgn="base" hangingPunct="0">
-                <a:spcBef>
-                  <a:spcPct val="0"/>
-                </a:spcBef>
-                <a:spcAft>
-                  <a:spcPct val="0"/>
-                </a:spcAft>
-                <a:defRPr>
-                  <a:solidFill>
-                    <a:schemeClr val="tx1"/>
-                  </a:solidFill>
-                  <a:latin typeface="Calibri" panose="020F0502020204030204" pitchFamily="34" charset="0"/>
-                </a:defRPr>
-              </a:lvl7pPr>
-              <a:lvl8pPr marL="3429000" indent="-228600" eaLnBrk="0" fontAlgn="base" hangingPunct="0">
-                <a:spcBef>
-                  <a:spcPct val="0"/>
-                </a:spcBef>
-                <a:spcAft>
-                  <a:spcPct val="0"/>
-                </a:spcAft>
-                <a:defRPr>
-                  <a:solidFill>
-                    <a:schemeClr val="tx1"/>
-                  </a:solidFill>
-                  <a:latin typeface="Calibri" panose="020F0502020204030204" pitchFamily="34" charset="0"/>
-                </a:defRPr>
-              </a:lvl8pPr>
-              <a:lvl9pPr marL="3886200" indent="-228600" eaLnBrk="0" fontAlgn="base" hangingPunct="0">
-                <a:spcBef>
-                  <a:spcPct val="0"/>
-                </a:spcBef>
-                <a:spcAft>
-                  <a:spcPct val="0"/>
-                </a:spcAft>
-                <a:defRPr>
-                  <a:solidFill>
-                    <a:schemeClr val="tx1"/>
-                  </a:solidFill>
-                  <a:latin typeface="Calibri" panose="020F0502020204030204" pitchFamily="34" charset="0"/>
-                </a:defRPr>
-              </a:lvl9pPr>
-            </a:lstStyle>
-            <a:p>
-              <a:pPr algn="ctr" eaLnBrk="1" hangingPunct="1"/>
-              <a:r>
-                <a:rPr lang="en-US" altLang="en-US" sz="1200" dirty="0">
-                  <a:latin typeface="Arial" panose="020B0604020202020204" pitchFamily="34" charset="0"/>
-                  <a:ea typeface="Amazon Ember" panose="020B0603020204020204" pitchFamily="34" charset="0"/>
-                  <a:cs typeface="Arial" panose="020B0604020202020204" pitchFamily="34" charset="0"/>
-                </a:rPr>
-                <a:t>NAT gateway</a:t>
-              </a:r>
-            </a:p>
-          </p:txBody>
-        </p:sp>
-      </p:grpSp>
       <p:grpSp>
         <p:nvGrpSpPr>
           <p:cNvPr id="2" name="Group 1">
@@ -16291,10 +15942,10 @@
         </p:nvGrpSpPr>
         <p:grpSpPr>
           <a:xfrm>
-            <a:off x="1645920" y="1188720"/>
-            <a:ext cx="2194560" cy="1188720"/>
+            <a:off x="2194560" y="1737361"/>
+            <a:ext cx="2194560" cy="1202329"/>
             <a:chOff x="1097280" y="914399"/>
-            <a:chExt cx="2194560" cy="1188721"/>
+            <a:chExt cx="2194560" cy="1202330"/>
           </a:xfrm>
         </p:grpSpPr>
         <p:sp>
@@ -16314,7 +15965,7 @@
           <p:spPr bwMode="auto">
             <a:xfrm>
               <a:off x="2103120" y="1655064"/>
-              <a:ext cx="1188720" cy="276999"/>
+              <a:ext cx="1188720" cy="461665"/>
             </a:xfrm>
             <a:prstGeom prst="rect">
               <a:avLst/>
@@ -16789,7 +16440,7 @@
         </p:nvGrpSpPr>
         <p:grpSpPr>
           <a:xfrm>
-            <a:off x="4114800" y="1188720"/>
+            <a:off x="4663441" y="1737361"/>
             <a:ext cx="2227061" cy="1202329"/>
             <a:chOff x="973339" y="894539"/>
             <a:chExt cx="2227061" cy="1202329"/>
@@ -17302,8 +16953,8 @@
         </p:nvSpPr>
         <p:spPr>
           <a:xfrm>
-            <a:off x="1645920" y="2468880"/>
-            <a:ext cx="2194560" cy="3383280"/>
+            <a:off x="2194560" y="3017520"/>
+            <a:ext cx="2194560" cy="3931920"/>
           </a:xfrm>
           <a:prstGeom prst="rect">
             <a:avLst/>
@@ -17379,7 +17030,7 @@
         </p:blipFill>
         <p:spPr>
           <a:xfrm>
-            <a:off x="1645920" y="2468880"/>
+            <a:off x="2194560" y="3017520"/>
             <a:ext cx="381000" cy="381000"/>
           </a:xfrm>
           <a:prstGeom prst="rect">
@@ -17401,7 +17052,7 @@
         </p:nvGrpSpPr>
         <p:grpSpPr>
           <a:xfrm>
-            <a:off x="1645920" y="2788920"/>
+            <a:off x="2194560" y="3337561"/>
             <a:ext cx="1097280" cy="688479"/>
             <a:chOff x="1645920" y="2834640"/>
             <a:chExt cx="1097280" cy="688479"/>
@@ -17619,10 +17270,10 @@
         </p:nvGrpSpPr>
         <p:grpSpPr>
           <a:xfrm>
-            <a:off x="2679878" y="2788920"/>
-            <a:ext cx="1188720" cy="688479"/>
+            <a:off x="3228518" y="3337561"/>
+            <a:ext cx="1188720" cy="873145"/>
             <a:chOff x="2679878" y="2834640"/>
-            <a:chExt cx="1188720" cy="688479"/>
+            <a:chExt cx="1188720" cy="873145"/>
           </a:xfrm>
         </p:grpSpPr>
         <p:pic>
@@ -17678,7 +17329,7 @@
           <p:spPr bwMode="auto">
             <a:xfrm>
               <a:off x="2679878" y="3246120"/>
-              <a:ext cx="1188720" cy="276999"/>
+              <a:ext cx="1188720" cy="461665"/>
             </a:xfrm>
             <a:prstGeom prst="rect">
               <a:avLst/>
@@ -17825,10 +17476,10 @@
       </p:grpSp>
       <p:grpSp>
         <p:nvGrpSpPr>
-          <p:cNvPr id="16" name="Group 15">
+          <p:cNvPr id="7" name="Group 6">
             <a:extLst>
               <a:ext uri="{FF2B5EF4-FFF2-40B4-BE49-F238E27FC236}">
-                <a16:creationId xmlns:a16="http://schemas.microsoft.com/office/drawing/2014/main" id="{B6415029-084D-4E8E-852F-8A87467E642E}"/>
+                <a16:creationId xmlns:a16="http://schemas.microsoft.com/office/drawing/2014/main" id="{98FC898B-EF74-4FB1-B44E-0F676534B1D5}"/>
               </a:ext>
             </a:extLst>
           </p:cNvPr>
@@ -17837,73 +17488,12 @@
         </p:nvGrpSpPr>
         <p:grpSpPr>
           <a:xfrm>
-            <a:off x="1737360" y="4754880"/>
-            <a:ext cx="5943600" cy="1005840"/>
-            <a:chOff x="1737360" y="4846320"/>
-            <a:chExt cx="5943600" cy="1005840"/>
+            <a:off x="7330440" y="5897880"/>
+            <a:ext cx="914400" cy="864001"/>
+            <a:chOff x="8763000" y="6922008"/>
+            <a:chExt cx="914400" cy="864001"/>
           </a:xfrm>
         </p:grpSpPr>
-        <p:sp>
-          <p:nvSpPr>
-            <p:cNvPr id="88" name="Rectangle 87">
-              <a:extLst>
-                <a:ext uri="{FF2B5EF4-FFF2-40B4-BE49-F238E27FC236}">
-                  <a16:creationId xmlns:a16="http://schemas.microsoft.com/office/drawing/2014/main" id="{07D448D9-DE46-4DCA-85D4-72F20B376FBB}"/>
-                </a:ext>
-              </a:extLst>
-            </p:cNvPr>
-            <p:cNvSpPr/>
-            <p:nvPr/>
-          </p:nvSpPr>
-          <p:spPr>
-            <a:xfrm>
-              <a:off x="1737360" y="4846320"/>
-              <a:ext cx="5943600" cy="1005840"/>
-            </a:xfrm>
-            <a:prstGeom prst="rect">
-              <a:avLst/>
-            </a:prstGeom>
-            <a:noFill/>
-            <a:ln w="15875">
-              <a:solidFill>
-                <a:srgbClr val="CA24D1"/>
-              </a:solidFill>
-              <a:prstDash val="dash"/>
-            </a:ln>
-          </p:spPr>
-          <p:style>
-            <a:lnRef idx="2">
-              <a:schemeClr val="accent1">
-                <a:shade val="50000"/>
-              </a:schemeClr>
-            </a:lnRef>
-            <a:fillRef idx="1">
-              <a:schemeClr val="accent1"/>
-            </a:fillRef>
-            <a:effectRef idx="0">
-              <a:schemeClr val="accent1"/>
-            </a:effectRef>
-            <a:fontRef idx="minor">
-              <a:schemeClr val="lt1"/>
-            </a:fontRef>
-          </p:style>
-          <p:txBody>
-            <a:bodyPr tIns="91440"/>
-            <a:lstStyle/>
-            <a:p>
-              <a:pPr algn="ctr">
-                <a:defRPr/>
-              </a:pPr>
-              <a:endParaRPr lang="en-US" sz="1200" dirty="0">
-                <a:solidFill>
-                  <a:schemeClr val="tx1"/>
-                </a:solidFill>
-                <a:latin typeface="Arial" panose="020B0604020202020204" pitchFamily="34" charset="0"/>
-                <a:cs typeface="Arial" panose="020B0604020202020204" pitchFamily="34" charset="0"/>
-              </a:endParaRPr>
-            </a:p>
-          </p:txBody>
-        </p:sp>
         <p:pic>
           <p:nvPicPr>
             <p:cNvPr id="89" name="Graphic 88">
@@ -17932,7 +17522,7 @@
           </p:blipFill>
           <p:spPr>
             <a:xfrm>
-              <a:off x="6858000" y="4956048"/>
+              <a:off x="8991600" y="6922008"/>
               <a:ext cx="457200" cy="457200"/>
             </a:xfrm>
             <a:prstGeom prst="rect">
@@ -17956,7 +17546,7 @@
           </p:nvSpPr>
           <p:spPr bwMode="auto">
             <a:xfrm>
-              <a:off x="6629400" y="5340096"/>
+              <a:off x="8763000" y="7324344"/>
               <a:ext cx="914400" cy="461665"/>
             </a:xfrm>
             <a:prstGeom prst="rect">
@@ -18101,6 +17691,27 @@
             </a:p>
           </p:txBody>
         </p:sp>
+      </p:grpSp>
+      <p:grpSp>
+        <p:nvGrpSpPr>
+          <p:cNvPr id="4" name="Group 3">
+            <a:extLst>
+              <a:ext uri="{FF2B5EF4-FFF2-40B4-BE49-F238E27FC236}">
+                <a16:creationId xmlns:a16="http://schemas.microsoft.com/office/drawing/2014/main" id="{785E6360-129B-46E7-84C7-AE663F1242EC}"/>
+              </a:ext>
+            </a:extLst>
+          </p:cNvPr>
+          <p:cNvGrpSpPr/>
+          <p:nvPr/>
+        </p:nvGrpSpPr>
+        <p:grpSpPr>
+          <a:xfrm>
+            <a:off x="2712720" y="5897880"/>
+            <a:ext cx="1188720" cy="866448"/>
+            <a:chOff x="4299344" y="6903720"/>
+            <a:chExt cx="1188720" cy="866448"/>
+          </a:xfrm>
+        </p:grpSpPr>
         <p:pic>
           <p:nvPicPr>
             <p:cNvPr id="91" name="Graphic 90">
@@ -18129,7 +17740,7 @@
           </p:blipFill>
           <p:spPr>
             <a:xfrm>
-              <a:off x="2523744" y="4937760"/>
+              <a:off x="4657344" y="6903720"/>
               <a:ext cx="457200" cy="457200"/>
             </a:xfrm>
             <a:prstGeom prst="rect">
@@ -18153,7 +17764,7 @@
           </p:nvSpPr>
           <p:spPr bwMode="auto">
             <a:xfrm>
-              <a:off x="2165744" y="5342543"/>
+              <a:off x="4299344" y="7308503"/>
               <a:ext cx="1188720" cy="461665"/>
             </a:xfrm>
             <a:prstGeom prst="rect">
@@ -18298,6 +17909,27 @@
             </a:p>
           </p:txBody>
         </p:sp>
+      </p:grpSp>
+      <p:grpSp>
+        <p:nvGrpSpPr>
+          <p:cNvPr id="5" name="Group 4">
+            <a:extLst>
+              <a:ext uri="{FF2B5EF4-FFF2-40B4-BE49-F238E27FC236}">
+                <a16:creationId xmlns:a16="http://schemas.microsoft.com/office/drawing/2014/main" id="{021583CC-DBBF-45E5-B8E4-E664302D6896}"/>
+              </a:ext>
+            </a:extLst>
+          </p:cNvPr>
+          <p:cNvGrpSpPr/>
+          <p:nvPr/>
+        </p:nvGrpSpPr>
+        <p:grpSpPr>
+          <a:xfrm>
+            <a:off x="5175504" y="5897880"/>
+            <a:ext cx="1188720" cy="864001"/>
+            <a:chOff x="6760464" y="6918960"/>
+            <a:chExt cx="1188720" cy="864001"/>
+          </a:xfrm>
+        </p:grpSpPr>
         <p:pic>
           <p:nvPicPr>
             <p:cNvPr id="92" name="Graphic 91">
@@ -18326,7 +17958,7 @@
           </p:blipFill>
           <p:spPr>
             <a:xfrm>
-              <a:off x="4992624" y="4953000"/>
+              <a:off x="7126224" y="6918960"/>
               <a:ext cx="457200" cy="457200"/>
             </a:xfrm>
             <a:prstGeom prst="rect">
@@ -18350,7 +17982,7 @@
           </p:nvSpPr>
           <p:spPr bwMode="auto">
             <a:xfrm>
-              <a:off x="4626864" y="5342543"/>
+              <a:off x="6760464" y="7321296"/>
               <a:ext cx="1188720" cy="461665"/>
             </a:xfrm>
             <a:prstGeom prst="rect">
@@ -18510,8 +18142,8 @@
         </p:nvSpPr>
         <p:spPr>
           <a:xfrm>
-            <a:off x="4114800" y="2468880"/>
-            <a:ext cx="2194560" cy="3383280"/>
+            <a:off x="4663440" y="3017520"/>
+            <a:ext cx="2194560" cy="3931920"/>
           </a:xfrm>
           <a:prstGeom prst="rect">
             <a:avLst/>
@@ -18587,7 +18219,7 @@
         </p:blipFill>
         <p:spPr>
           <a:xfrm>
-            <a:off x="4118018" y="2468880"/>
+            <a:off x="4666658" y="3017520"/>
             <a:ext cx="381000" cy="381000"/>
           </a:xfrm>
           <a:prstGeom prst="rect">
@@ -18609,7 +18241,7 @@
         </p:nvGrpSpPr>
         <p:grpSpPr>
           <a:xfrm>
-            <a:off x="4155979" y="2788920"/>
+            <a:off x="4704619" y="3337561"/>
             <a:ext cx="1097280" cy="688479"/>
             <a:chOff x="4155979" y="2834640"/>
             <a:chExt cx="1097280" cy="688479"/>
@@ -18827,7 +18459,7 @@
         </p:nvGrpSpPr>
         <p:grpSpPr>
           <a:xfrm>
-            <a:off x="5167702" y="2788920"/>
+            <a:off x="5716342" y="3337561"/>
             <a:ext cx="1188720" cy="873145"/>
             <a:chOff x="5167702" y="2834640"/>
             <a:chExt cx="1188720" cy="873145"/>
@@ -19060,10 +18692,10 @@
         </p:nvGrpSpPr>
         <p:grpSpPr>
           <a:xfrm>
-            <a:off x="1737360" y="3657600"/>
-            <a:ext cx="8229600" cy="1005840"/>
+            <a:off x="2286000" y="4206240"/>
+            <a:ext cx="8503920" cy="1188720"/>
             <a:chOff x="1737360" y="3749040"/>
-            <a:chExt cx="8229600" cy="1005840"/>
+            <a:chExt cx="8503920" cy="1188720"/>
           </a:xfrm>
         </p:grpSpPr>
         <p:sp>
@@ -19081,7 +18713,7 @@
           <p:spPr>
             <a:xfrm>
               <a:off x="1737360" y="3749040"/>
-              <a:ext cx="8229600" cy="1005840"/>
+              <a:ext cx="8503920" cy="1188720"/>
             </a:xfrm>
             <a:prstGeom prst="rect">
               <a:avLst/>
@@ -19181,7 +18813,7 @@
           </p:blipFill>
           <p:spPr>
             <a:xfrm>
-              <a:off x="6858000" y="3749040"/>
+              <a:off x="7010400" y="3749040"/>
               <a:ext cx="381000" cy="381000"/>
             </a:xfrm>
             <a:prstGeom prst="rect">
@@ -19189,12 +18821,564 @@
             </a:prstGeom>
           </p:spPr>
         </p:pic>
+        <p:sp>
+          <p:nvSpPr>
+            <p:cNvPr id="99" name="TextBox 16">
+              <a:extLst>
+                <a:ext uri="{FF2B5EF4-FFF2-40B4-BE49-F238E27FC236}">
+                  <a16:creationId xmlns:a16="http://schemas.microsoft.com/office/drawing/2014/main" id="{42E05ABE-1BB6-4752-863A-AF81F4E480E3}"/>
+                </a:ext>
+              </a:extLst>
+            </p:cNvPr>
+            <p:cNvSpPr txBox="1">
+              <a:spLocks noChangeArrowheads="1"/>
+            </p:cNvSpPr>
+            <p:nvPr/>
+          </p:nvSpPr>
+          <p:spPr bwMode="auto">
+            <a:xfrm>
+              <a:off x="1981200" y="4259370"/>
+              <a:ext cx="1554480" cy="640080"/>
+            </a:xfrm>
+            <a:prstGeom prst="rect">
+              <a:avLst/>
+            </a:prstGeom>
+            <a:noFill/>
+            <a:ln>
+              <a:noFill/>
+            </a:ln>
+            <a:extLst>
+              <a:ext uri="{909E8E84-426E-40DD-AFC4-6F175D3DCCD1}">
+                <a14:hiddenFill xmlns:a14="http://schemas.microsoft.com/office/drawing/2010/main">
+                  <a:solidFill>
+                    <a:srgbClr val="FFFFFF"/>
+                  </a:solidFill>
+                </a14:hiddenFill>
+              </a:ext>
+              <a:ext uri="{91240B29-F687-4F45-9708-019B960494DF}">
+                <a14:hiddenLine xmlns:a14="http://schemas.microsoft.com/office/drawing/2010/main" w="9525">
+                  <a:solidFill>
+                    <a:srgbClr val="000000"/>
+                  </a:solidFill>
+                  <a:miter lim="800000"/>
+                  <a:headEnd/>
+                  <a:tailEnd/>
+                </a14:hiddenLine>
+              </a:ext>
+            </a:extLst>
+          </p:spPr>
+          <p:txBody>
+            <a:bodyPr wrap="square" lIns="0" rIns="0">
+              <a:spAutoFit/>
+            </a:bodyPr>
+            <a:lstStyle>
+              <a:lvl1pPr>
+                <a:defRPr>
+                  <a:solidFill>
+                    <a:schemeClr val="tx1"/>
+                  </a:solidFill>
+                  <a:latin typeface="Calibri" panose="020F0502020204030204" pitchFamily="34" charset="0"/>
+                </a:defRPr>
+              </a:lvl1pPr>
+              <a:lvl2pPr marL="742950" indent="-285750">
+                <a:defRPr>
+                  <a:solidFill>
+                    <a:schemeClr val="tx1"/>
+                  </a:solidFill>
+                  <a:latin typeface="Calibri" panose="020F0502020204030204" pitchFamily="34" charset="0"/>
+                </a:defRPr>
+              </a:lvl2pPr>
+              <a:lvl3pPr marL="1143000" indent="-228600">
+                <a:defRPr>
+                  <a:solidFill>
+                    <a:schemeClr val="tx1"/>
+                  </a:solidFill>
+                  <a:latin typeface="Calibri" panose="020F0502020204030204" pitchFamily="34" charset="0"/>
+                </a:defRPr>
+              </a:lvl3pPr>
+              <a:lvl4pPr marL="1600200" indent="-228600">
+                <a:defRPr>
+                  <a:solidFill>
+                    <a:schemeClr val="tx1"/>
+                  </a:solidFill>
+                  <a:latin typeface="Calibri" panose="020F0502020204030204" pitchFamily="34" charset="0"/>
+                </a:defRPr>
+              </a:lvl4pPr>
+              <a:lvl5pPr marL="2057400" indent="-228600">
+                <a:defRPr>
+                  <a:solidFill>
+                    <a:schemeClr val="tx1"/>
+                  </a:solidFill>
+                  <a:latin typeface="Calibri" panose="020F0502020204030204" pitchFamily="34" charset="0"/>
+                </a:defRPr>
+              </a:lvl5pPr>
+              <a:lvl6pPr marL="2514600" indent="-228600" eaLnBrk="0" fontAlgn="base" hangingPunct="0">
+                <a:spcBef>
+                  <a:spcPct val="0"/>
+                </a:spcBef>
+                <a:spcAft>
+                  <a:spcPct val="0"/>
+                </a:spcAft>
+                <a:defRPr>
+                  <a:solidFill>
+                    <a:schemeClr val="tx1"/>
+                  </a:solidFill>
+                  <a:latin typeface="Calibri" panose="020F0502020204030204" pitchFamily="34" charset="0"/>
+                </a:defRPr>
+              </a:lvl6pPr>
+              <a:lvl7pPr marL="2971800" indent="-228600" eaLnBrk="0" fontAlgn="base" hangingPunct="0">
+                <a:spcBef>
+                  <a:spcPct val="0"/>
+                </a:spcBef>
+                <a:spcAft>
+                  <a:spcPct val="0"/>
+                </a:spcAft>
+                <a:defRPr>
+                  <a:solidFill>
+                    <a:schemeClr val="tx1"/>
+                  </a:solidFill>
+                  <a:latin typeface="Calibri" panose="020F0502020204030204" pitchFamily="34" charset="0"/>
+                </a:defRPr>
+              </a:lvl7pPr>
+              <a:lvl8pPr marL="3429000" indent="-228600" eaLnBrk="0" fontAlgn="base" hangingPunct="0">
+                <a:spcBef>
+                  <a:spcPct val="0"/>
+                </a:spcBef>
+                <a:spcAft>
+                  <a:spcPct val="0"/>
+                </a:spcAft>
+                <a:defRPr>
+                  <a:solidFill>
+                    <a:schemeClr val="tx1"/>
+                  </a:solidFill>
+                  <a:latin typeface="Calibri" panose="020F0502020204030204" pitchFamily="34" charset="0"/>
+                </a:defRPr>
+              </a:lvl8pPr>
+              <a:lvl9pPr marL="3886200" indent="-228600" eaLnBrk="0" fontAlgn="base" hangingPunct="0">
+                <a:spcBef>
+                  <a:spcPct val="0"/>
+                </a:spcBef>
+                <a:spcAft>
+                  <a:spcPct val="0"/>
+                </a:spcAft>
+                <a:defRPr>
+                  <a:solidFill>
+                    <a:schemeClr val="tx1"/>
+                  </a:solidFill>
+                  <a:latin typeface="Calibri" panose="020F0502020204030204" pitchFamily="34" charset="0"/>
+                </a:defRPr>
+              </a:lvl9pPr>
+            </a:lstStyle>
+            <a:p>
+              <a:pPr algn="ctr" eaLnBrk="1" hangingPunct="1"/>
+              <a:r>
+                <a:rPr lang="en-US" altLang="en-US" sz="1200" dirty="0">
+                  <a:latin typeface="Arial" panose="020B0604020202020204" pitchFamily="34" charset="0"/>
+                  <a:ea typeface="Amazon Ember" panose="020B0603020204020204" pitchFamily="34" charset="0"/>
+                  <a:cs typeface="Arial" panose="020B0604020202020204" pitchFamily="34" charset="0"/>
+                </a:rPr>
+                <a:t>Environment, data lake, and data hub cluster nodes</a:t>
+              </a:r>
+            </a:p>
+          </p:txBody>
+        </p:sp>
+        <p:sp>
+          <p:nvSpPr>
+            <p:cNvPr id="56" name="TextBox 16">
+              <a:extLst>
+                <a:ext uri="{FF2B5EF4-FFF2-40B4-BE49-F238E27FC236}">
+                  <a16:creationId xmlns:a16="http://schemas.microsoft.com/office/drawing/2014/main" id="{79C81D3E-38B8-401B-9203-E054B052BDFB}"/>
+                </a:ext>
+              </a:extLst>
+            </p:cNvPr>
+            <p:cNvSpPr txBox="1">
+              <a:spLocks noChangeArrowheads="1"/>
+            </p:cNvSpPr>
+            <p:nvPr/>
+          </p:nvSpPr>
+          <p:spPr bwMode="auto">
+            <a:xfrm>
+              <a:off x="4450080" y="4261103"/>
+              <a:ext cx="1554480" cy="640080"/>
+            </a:xfrm>
+            <a:prstGeom prst="rect">
+              <a:avLst/>
+            </a:prstGeom>
+            <a:noFill/>
+            <a:ln>
+              <a:noFill/>
+            </a:ln>
+            <a:extLst>
+              <a:ext uri="{909E8E84-426E-40DD-AFC4-6F175D3DCCD1}">
+                <a14:hiddenFill xmlns:a14="http://schemas.microsoft.com/office/drawing/2010/main">
+                  <a:solidFill>
+                    <a:srgbClr val="FFFFFF"/>
+                  </a:solidFill>
+                </a14:hiddenFill>
+              </a:ext>
+              <a:ext uri="{91240B29-F687-4F45-9708-019B960494DF}">
+                <a14:hiddenLine xmlns:a14="http://schemas.microsoft.com/office/drawing/2010/main" w="9525">
+                  <a:solidFill>
+                    <a:srgbClr val="000000"/>
+                  </a:solidFill>
+                  <a:miter lim="800000"/>
+                  <a:headEnd/>
+                  <a:tailEnd/>
+                </a14:hiddenLine>
+              </a:ext>
+            </a:extLst>
+          </p:spPr>
+          <p:txBody>
+            <a:bodyPr wrap="square" lIns="0" rIns="0">
+              <a:spAutoFit/>
+            </a:bodyPr>
+            <a:lstStyle>
+              <a:lvl1pPr>
+                <a:defRPr>
+                  <a:solidFill>
+                    <a:schemeClr val="tx1"/>
+                  </a:solidFill>
+                  <a:latin typeface="Calibri" panose="020F0502020204030204" pitchFamily="34" charset="0"/>
+                </a:defRPr>
+              </a:lvl1pPr>
+              <a:lvl2pPr marL="742950" indent="-285750">
+                <a:defRPr>
+                  <a:solidFill>
+                    <a:schemeClr val="tx1"/>
+                  </a:solidFill>
+                  <a:latin typeface="Calibri" panose="020F0502020204030204" pitchFamily="34" charset="0"/>
+                </a:defRPr>
+              </a:lvl2pPr>
+              <a:lvl3pPr marL="1143000" indent="-228600">
+                <a:defRPr>
+                  <a:solidFill>
+                    <a:schemeClr val="tx1"/>
+                  </a:solidFill>
+                  <a:latin typeface="Calibri" panose="020F0502020204030204" pitchFamily="34" charset="0"/>
+                </a:defRPr>
+              </a:lvl3pPr>
+              <a:lvl4pPr marL="1600200" indent="-228600">
+                <a:defRPr>
+                  <a:solidFill>
+                    <a:schemeClr val="tx1"/>
+                  </a:solidFill>
+                  <a:latin typeface="Calibri" panose="020F0502020204030204" pitchFamily="34" charset="0"/>
+                </a:defRPr>
+              </a:lvl4pPr>
+              <a:lvl5pPr marL="2057400" indent="-228600">
+                <a:defRPr>
+                  <a:solidFill>
+                    <a:schemeClr val="tx1"/>
+                  </a:solidFill>
+                  <a:latin typeface="Calibri" panose="020F0502020204030204" pitchFamily="34" charset="0"/>
+                </a:defRPr>
+              </a:lvl5pPr>
+              <a:lvl6pPr marL="2514600" indent="-228600" eaLnBrk="0" fontAlgn="base" hangingPunct="0">
+                <a:spcBef>
+                  <a:spcPct val="0"/>
+                </a:spcBef>
+                <a:spcAft>
+                  <a:spcPct val="0"/>
+                </a:spcAft>
+                <a:defRPr>
+                  <a:solidFill>
+                    <a:schemeClr val="tx1"/>
+                  </a:solidFill>
+                  <a:latin typeface="Calibri" panose="020F0502020204030204" pitchFamily="34" charset="0"/>
+                </a:defRPr>
+              </a:lvl6pPr>
+              <a:lvl7pPr marL="2971800" indent="-228600" eaLnBrk="0" fontAlgn="base" hangingPunct="0">
+                <a:spcBef>
+                  <a:spcPct val="0"/>
+                </a:spcBef>
+                <a:spcAft>
+                  <a:spcPct val="0"/>
+                </a:spcAft>
+                <a:defRPr>
+                  <a:solidFill>
+                    <a:schemeClr val="tx1"/>
+                  </a:solidFill>
+                  <a:latin typeface="Calibri" panose="020F0502020204030204" pitchFamily="34" charset="0"/>
+                </a:defRPr>
+              </a:lvl7pPr>
+              <a:lvl8pPr marL="3429000" indent="-228600" eaLnBrk="0" fontAlgn="base" hangingPunct="0">
+                <a:spcBef>
+                  <a:spcPct val="0"/>
+                </a:spcBef>
+                <a:spcAft>
+                  <a:spcPct val="0"/>
+                </a:spcAft>
+                <a:defRPr>
+                  <a:solidFill>
+                    <a:schemeClr val="tx1"/>
+                  </a:solidFill>
+                  <a:latin typeface="Calibri" panose="020F0502020204030204" pitchFamily="34" charset="0"/>
+                </a:defRPr>
+              </a:lvl8pPr>
+              <a:lvl9pPr marL="3886200" indent="-228600" eaLnBrk="0" fontAlgn="base" hangingPunct="0">
+                <a:spcBef>
+                  <a:spcPct val="0"/>
+                </a:spcBef>
+                <a:spcAft>
+                  <a:spcPct val="0"/>
+                </a:spcAft>
+                <a:defRPr>
+                  <a:solidFill>
+                    <a:schemeClr val="tx1"/>
+                  </a:solidFill>
+                  <a:latin typeface="Calibri" panose="020F0502020204030204" pitchFamily="34" charset="0"/>
+                </a:defRPr>
+              </a:lvl9pPr>
+            </a:lstStyle>
+            <a:p>
+              <a:pPr algn="ctr" eaLnBrk="1" hangingPunct="1"/>
+              <a:r>
+                <a:rPr lang="en-US" altLang="en-US" sz="1200" dirty="0">
+                  <a:latin typeface="Arial" panose="020B0604020202020204" pitchFamily="34" charset="0"/>
+                  <a:ea typeface="Amazon Ember" panose="020B0603020204020204" pitchFamily="34" charset="0"/>
+                  <a:cs typeface="Arial" panose="020B0604020202020204" pitchFamily="34" charset="0"/>
+                </a:rPr>
+                <a:t>Environment, data lake, and data hub cluster nodes</a:t>
+              </a:r>
+            </a:p>
+          </p:txBody>
+        </p:sp>
+        <p:sp>
+          <p:nvSpPr>
+            <p:cNvPr id="61" name="TextBox 16">
+              <a:extLst>
+                <a:ext uri="{FF2B5EF4-FFF2-40B4-BE49-F238E27FC236}">
+                  <a16:creationId xmlns:a16="http://schemas.microsoft.com/office/drawing/2014/main" id="{A995FF07-7FA1-46C9-98A2-E9DC2E8585AE}"/>
+                </a:ext>
+              </a:extLst>
+            </p:cNvPr>
+            <p:cNvSpPr txBox="1">
+              <a:spLocks noChangeArrowheads="1"/>
+            </p:cNvSpPr>
+            <p:nvPr/>
+          </p:nvSpPr>
+          <p:spPr bwMode="auto">
+            <a:xfrm>
+              <a:off x="8528304" y="4261104"/>
+              <a:ext cx="1463040" cy="640080"/>
+            </a:xfrm>
+            <a:prstGeom prst="rect">
+              <a:avLst/>
+            </a:prstGeom>
+            <a:noFill/>
+            <a:ln>
+              <a:noFill/>
+            </a:ln>
+            <a:extLst>
+              <a:ext uri="{909E8E84-426E-40DD-AFC4-6F175D3DCCD1}">
+                <a14:hiddenFill xmlns:a14="http://schemas.microsoft.com/office/drawing/2010/main">
+                  <a:solidFill>
+                    <a:srgbClr val="FFFFFF"/>
+                  </a:solidFill>
+                </a14:hiddenFill>
+              </a:ext>
+              <a:ext uri="{91240B29-F687-4F45-9708-019B960494DF}">
+                <a14:hiddenLine xmlns:a14="http://schemas.microsoft.com/office/drawing/2010/main" w="9525">
+                  <a:solidFill>
+                    <a:srgbClr val="000000"/>
+                  </a:solidFill>
+                  <a:miter lim="800000"/>
+                  <a:headEnd/>
+                  <a:tailEnd/>
+                </a14:hiddenLine>
+              </a:ext>
+            </a:extLst>
+          </p:spPr>
+          <p:txBody>
+            <a:bodyPr wrap="square" lIns="0" rIns="0">
+              <a:spAutoFit/>
+            </a:bodyPr>
+            <a:lstStyle>
+              <a:lvl1pPr>
+                <a:defRPr>
+                  <a:solidFill>
+                    <a:schemeClr val="tx1"/>
+                  </a:solidFill>
+                  <a:latin typeface="Calibri" panose="020F0502020204030204" pitchFamily="34" charset="0"/>
+                </a:defRPr>
+              </a:lvl1pPr>
+              <a:lvl2pPr marL="742950" indent="-285750">
+                <a:defRPr>
+                  <a:solidFill>
+                    <a:schemeClr val="tx1"/>
+                  </a:solidFill>
+                  <a:latin typeface="Calibri" panose="020F0502020204030204" pitchFamily="34" charset="0"/>
+                </a:defRPr>
+              </a:lvl2pPr>
+              <a:lvl3pPr marL="1143000" indent="-228600">
+                <a:defRPr>
+                  <a:solidFill>
+                    <a:schemeClr val="tx1"/>
+                  </a:solidFill>
+                  <a:latin typeface="Calibri" panose="020F0502020204030204" pitchFamily="34" charset="0"/>
+                </a:defRPr>
+              </a:lvl3pPr>
+              <a:lvl4pPr marL="1600200" indent="-228600">
+                <a:defRPr>
+                  <a:solidFill>
+                    <a:schemeClr val="tx1"/>
+                  </a:solidFill>
+                  <a:latin typeface="Calibri" panose="020F0502020204030204" pitchFamily="34" charset="0"/>
+                </a:defRPr>
+              </a:lvl4pPr>
+              <a:lvl5pPr marL="2057400" indent="-228600">
+                <a:defRPr>
+                  <a:solidFill>
+                    <a:schemeClr val="tx1"/>
+                  </a:solidFill>
+                  <a:latin typeface="Calibri" panose="020F0502020204030204" pitchFamily="34" charset="0"/>
+                </a:defRPr>
+              </a:lvl5pPr>
+              <a:lvl6pPr marL="2514600" indent="-228600" eaLnBrk="0" fontAlgn="base" hangingPunct="0">
+                <a:spcBef>
+                  <a:spcPct val="0"/>
+                </a:spcBef>
+                <a:spcAft>
+                  <a:spcPct val="0"/>
+                </a:spcAft>
+                <a:defRPr>
+                  <a:solidFill>
+                    <a:schemeClr val="tx1"/>
+                  </a:solidFill>
+                  <a:latin typeface="Calibri" panose="020F0502020204030204" pitchFamily="34" charset="0"/>
+                </a:defRPr>
+              </a:lvl6pPr>
+              <a:lvl7pPr marL="2971800" indent="-228600" eaLnBrk="0" fontAlgn="base" hangingPunct="0">
+                <a:spcBef>
+                  <a:spcPct val="0"/>
+                </a:spcBef>
+                <a:spcAft>
+                  <a:spcPct val="0"/>
+                </a:spcAft>
+                <a:defRPr>
+                  <a:solidFill>
+                    <a:schemeClr val="tx1"/>
+                  </a:solidFill>
+                  <a:latin typeface="Calibri" panose="020F0502020204030204" pitchFamily="34" charset="0"/>
+                </a:defRPr>
+              </a:lvl7pPr>
+              <a:lvl8pPr marL="3429000" indent="-228600" eaLnBrk="0" fontAlgn="base" hangingPunct="0">
+                <a:spcBef>
+                  <a:spcPct val="0"/>
+                </a:spcBef>
+                <a:spcAft>
+                  <a:spcPct val="0"/>
+                </a:spcAft>
+                <a:defRPr>
+                  <a:solidFill>
+                    <a:schemeClr val="tx1"/>
+                  </a:solidFill>
+                  <a:latin typeface="Calibri" panose="020F0502020204030204" pitchFamily="34" charset="0"/>
+                </a:defRPr>
+              </a:lvl8pPr>
+              <a:lvl9pPr marL="3886200" indent="-228600" eaLnBrk="0" fontAlgn="base" hangingPunct="0">
+                <a:spcBef>
+                  <a:spcPct val="0"/>
+                </a:spcBef>
+                <a:spcAft>
+                  <a:spcPct val="0"/>
+                </a:spcAft>
+                <a:defRPr>
+                  <a:solidFill>
+                    <a:schemeClr val="tx1"/>
+                  </a:solidFill>
+                  <a:latin typeface="Calibri" panose="020F0502020204030204" pitchFamily="34" charset="0"/>
+                </a:defRPr>
+              </a:lvl9pPr>
+            </a:lstStyle>
+            <a:p>
+              <a:pPr algn="ctr" eaLnBrk="1" hangingPunct="1"/>
+              <a:r>
+                <a:rPr lang="en-US" altLang="en-US" sz="1200" dirty="0">
+                  <a:latin typeface="Arial" panose="020B0604020202020204" pitchFamily="34" charset="0"/>
+                  <a:ea typeface="Amazon Ember" panose="020B0603020204020204" pitchFamily="34" charset="0"/>
+                  <a:cs typeface="Arial" panose="020B0604020202020204" pitchFamily="34" charset="0"/>
+                </a:rPr>
+                <a:t>Environment, data lake, and data hub cluster nodes</a:t>
+              </a:r>
+            </a:p>
+          </p:txBody>
+        </p:sp>
+      </p:grpSp>
+      <p:grpSp>
+        <p:nvGrpSpPr>
+          <p:cNvPr id="16" name="Group 15">
+            <a:extLst>
+              <a:ext uri="{FF2B5EF4-FFF2-40B4-BE49-F238E27FC236}">
+                <a16:creationId xmlns:a16="http://schemas.microsoft.com/office/drawing/2014/main" id="{6541A584-72C4-4687-A884-8127DA1BBB74}"/>
+              </a:ext>
+            </a:extLst>
+          </p:cNvPr>
+          <p:cNvGrpSpPr/>
+          <p:nvPr/>
+        </p:nvGrpSpPr>
+        <p:grpSpPr>
+          <a:xfrm>
+            <a:off x="8656320" y="1005840"/>
+            <a:ext cx="2377440" cy="6126480"/>
+            <a:chOff x="9906000" y="2514600"/>
+            <a:chExt cx="2377440" cy="6126480"/>
+          </a:xfrm>
+        </p:grpSpPr>
+        <p:sp>
+          <p:nvSpPr>
+            <p:cNvPr id="75" name="Rectangle 74">
+              <a:extLst>
+                <a:ext uri="{FF2B5EF4-FFF2-40B4-BE49-F238E27FC236}">
+                  <a16:creationId xmlns:a16="http://schemas.microsoft.com/office/drawing/2014/main" id="{5ACE92BA-9F0A-44E0-8498-8A23464182E3}"/>
+                </a:ext>
+              </a:extLst>
+            </p:cNvPr>
+            <p:cNvSpPr/>
+            <p:nvPr/>
+          </p:nvSpPr>
+          <p:spPr>
+            <a:xfrm>
+              <a:off x="9906000" y="2514600"/>
+              <a:ext cx="2377440" cy="6126480"/>
+            </a:xfrm>
+            <a:prstGeom prst="rect">
+              <a:avLst/>
+            </a:prstGeom>
+            <a:noFill/>
+            <a:ln w="15875" cap="flat" cmpd="sng" algn="ctr">
+              <a:solidFill>
+                <a:srgbClr val="00A4A6"/>
+              </a:solidFill>
+              <a:prstDash val="dash"/>
+              <a:miter lim="800000"/>
+            </a:ln>
+            <a:effectLst/>
+          </p:spPr>
+          <p:txBody>
+            <a:bodyPr tIns="91440"/>
+            <a:lstStyle/>
+            <a:p>
+              <a:pPr algn="ctr" defTabSz="914377">
+                <a:buClrTx/>
+                <a:defRPr/>
+              </a:pPr>
+              <a:r>
+                <a:rPr lang="en-US" sz="1200" kern="1200" dirty="0">
+                  <a:ea typeface="+mn-ea"/>
+                  <a:cs typeface="Arial" panose="020B0604020202020204" pitchFamily="34" charset="0"/>
+                </a:rPr>
+                <a:t>Availability Zone 3</a:t>
+              </a:r>
+            </a:p>
+          </p:txBody>
+        </p:sp>
         <p:grpSp>
           <p:nvGrpSpPr>
-            <p:cNvPr id="3" name="Group 2">
+            <p:cNvPr id="6" name="Group 5">
               <a:extLst>
                 <a:ext uri="{FF2B5EF4-FFF2-40B4-BE49-F238E27FC236}">
-                  <a16:creationId xmlns:a16="http://schemas.microsoft.com/office/drawing/2014/main" id="{76FCD20A-DC64-4381-9A48-EC1DD7F7D93E}"/>
+                  <a16:creationId xmlns:a16="http://schemas.microsoft.com/office/drawing/2014/main" id="{DB5D8C14-3B94-4041-966B-2B5D0789FAB4}"/>
                 </a:ext>
               </a:extLst>
             </p:cNvPr>
@@ -19203,18 +19387,66 @@
           </p:nvGrpSpPr>
           <p:grpSpPr>
             <a:xfrm>
-              <a:off x="1795335" y="3840480"/>
-              <a:ext cx="1920240" cy="880556"/>
-              <a:chOff x="1492897" y="4206240"/>
-              <a:chExt cx="1920240" cy="880556"/>
+              <a:off x="9997440" y="3246120"/>
+              <a:ext cx="2194560" cy="1188720"/>
+              <a:chOff x="7863840" y="1463040"/>
+              <a:chExt cx="2194560" cy="1188720"/>
             </a:xfrm>
           </p:grpSpPr>
+          <p:sp>
+            <p:nvSpPr>
+              <p:cNvPr id="76" name="Rectangle 75">
+                <a:extLst>
+                  <a:ext uri="{FF2B5EF4-FFF2-40B4-BE49-F238E27FC236}">
+                    <a16:creationId xmlns:a16="http://schemas.microsoft.com/office/drawing/2014/main" id="{4C806C64-B97A-4746-AF20-03D0FA9BD30C}"/>
+                  </a:ext>
+                </a:extLst>
+              </p:cNvPr>
+              <p:cNvSpPr/>
+              <p:nvPr/>
+            </p:nvSpPr>
+            <p:spPr>
+              <a:xfrm>
+                <a:off x="7863840" y="1463040"/>
+                <a:ext cx="2194560" cy="1188720"/>
+              </a:xfrm>
+              <a:prstGeom prst="rect">
+                <a:avLst/>
+              </a:prstGeom>
+              <a:noFill/>
+              <a:ln w="15875" cap="flat" cmpd="sng" algn="ctr">
+                <a:solidFill>
+                  <a:srgbClr val="7AA116"/>
+                </a:solidFill>
+                <a:prstDash val="solid"/>
+                <a:miter lim="800000"/>
+              </a:ln>
+              <a:effectLst/>
+            </p:spPr>
+            <p:txBody>
+              <a:bodyPr lIns="502920" tIns="91440" bIns="45720"/>
+              <a:lstStyle/>
+              <a:p>
+                <a:pPr defTabSz="914377">
+                  <a:buClrTx/>
+                  <a:defRPr/>
+                </a:pPr>
+                <a:r>
+                  <a:rPr lang="en-US" sz="1200" kern="1200">
+                    <a:ea typeface="+mn-ea"/>
+                    <a:cs typeface="Arial" panose="020B0604020202020204" pitchFamily="34" charset="0"/>
+                  </a:rPr>
+                  <a:t>Public subnet</a:t>
+                </a:r>
+              </a:p>
+            </p:txBody>
+          </p:sp>
           <p:pic>
             <p:nvPicPr>
-              <p:cNvPr id="95" name="Graphic 94">
+              <p:cNvPr id="77" name="Graphic 76">
                 <a:extLst>
                   <a:ext uri="{FF2B5EF4-FFF2-40B4-BE49-F238E27FC236}">
-                    <a16:creationId xmlns:a16="http://schemas.microsoft.com/office/drawing/2014/main" id="{355CB46D-F462-4D7B-9DF5-C42AD1FB1E37}"/>
+                    <a16:creationId xmlns:a16="http://schemas.microsoft.com/office/drawing/2014/main" id="{8F512F4D-328E-49C5-BADC-1684002267CD}"/>
                   </a:ext>
                 </a:extLst>
               </p:cNvPr>
@@ -19224,10 +19456,45 @@
               <p:nvPr/>
             </p:nvPicPr>
             <p:blipFill>
-              <a:blip r:embed="rId21">
+              <a:blip r:embed="rId7">
                 <a:extLst>
                   <a:ext uri="{96DAC541-7B7A-43D3-8B79-37D633B846F1}">
-                    <asvg:svgBlip xmlns:asvg="http://schemas.microsoft.com/office/drawing/2016/SVG/main" r:embed="rId22"/>
+                    <asvg:svgBlip xmlns:asvg="http://schemas.microsoft.com/office/drawing/2016/SVG/main" r:embed="rId8"/>
+                  </a:ext>
+                </a:extLst>
+              </a:blip>
+              <a:srcRect/>
+              <a:stretch/>
+            </p:blipFill>
+            <p:spPr>
+              <a:xfrm>
+                <a:off x="7863840" y="1463040"/>
+                <a:ext cx="381000" cy="381000"/>
+              </a:xfrm>
+              <a:prstGeom prst="rect">
+                <a:avLst/>
+              </a:prstGeom>
+            </p:spPr>
+          </p:pic>
+          <p:pic>
+            <p:nvPicPr>
+              <p:cNvPr id="78" name="Graphic 77">
+                <a:extLst>
+                  <a:ext uri="{FF2B5EF4-FFF2-40B4-BE49-F238E27FC236}">
+                    <a16:creationId xmlns:a16="http://schemas.microsoft.com/office/drawing/2014/main" id="{588CB08E-B254-4B81-831F-1C90224584DB}"/>
+                  </a:ext>
+                </a:extLst>
+              </p:cNvPr>
+              <p:cNvPicPr>
+                <a:picLocks noChangeAspect="1"/>
+              </p:cNvPicPr>
+              <p:nvPr/>
+            </p:nvPicPr>
+            <p:blipFill>
+              <a:blip r:embed="rId9">
+                <a:extLst>
+                  <a:ext uri="{96DAC541-7B7A-43D3-8B79-37D633B846F1}">
+                    <asvg:svgBlip xmlns:asvg="http://schemas.microsoft.com/office/drawing/2016/SVG/main" r:embed="rId10"/>
                   </a:ext>
                 </a:extLst>
               </a:blip>
@@ -19237,79 +19504,7 @@
             </p:blipFill>
             <p:spPr>
               <a:xfrm>
-                <a:off x="2224417" y="4206240"/>
-                <a:ext cx="457200" cy="457200"/>
-              </a:xfrm>
-              <a:prstGeom prst="rect">
-                <a:avLst/>
-              </a:prstGeom>
-            </p:spPr>
-          </p:pic>
-          <p:pic>
-            <p:nvPicPr>
-              <p:cNvPr id="96" name="Graphic 95">
-                <a:extLst>
-                  <a:ext uri="{FF2B5EF4-FFF2-40B4-BE49-F238E27FC236}">
-                    <a16:creationId xmlns:a16="http://schemas.microsoft.com/office/drawing/2014/main" id="{7BBD8E91-7FCA-49C4-A185-E0DC3DD7535B}"/>
-                  </a:ext>
-                </a:extLst>
-              </p:cNvPr>
-              <p:cNvPicPr>
-                <a:picLocks noChangeAspect="1"/>
-              </p:cNvPicPr>
-              <p:nvPr/>
-            </p:nvPicPr>
-            <p:blipFill>
-              <a:blip r:embed="rId21">
-                <a:extLst>
-                  <a:ext uri="{96DAC541-7B7A-43D3-8B79-37D633B846F1}">
-                    <asvg:svgBlip xmlns:asvg="http://schemas.microsoft.com/office/drawing/2016/SVG/main" r:embed="rId22"/>
-                  </a:ext>
-                </a:extLst>
-              </a:blip>
-              <a:stretch>
-                <a:fillRect/>
-              </a:stretch>
-            </p:blipFill>
-            <p:spPr>
-              <a:xfrm>
-                <a:off x="1701261" y="4206240"/>
-                <a:ext cx="457200" cy="457200"/>
-              </a:xfrm>
-              <a:prstGeom prst="rect">
-                <a:avLst/>
-              </a:prstGeom>
-            </p:spPr>
-          </p:pic>
-          <p:pic>
-            <p:nvPicPr>
-              <p:cNvPr id="97" name="Graphic 96">
-                <a:extLst>
-                  <a:ext uri="{FF2B5EF4-FFF2-40B4-BE49-F238E27FC236}">
-                    <a16:creationId xmlns:a16="http://schemas.microsoft.com/office/drawing/2014/main" id="{449070EA-28AB-4917-A3A0-BD2FFE2707F2}"/>
-                  </a:ext>
-                </a:extLst>
-              </p:cNvPr>
-              <p:cNvPicPr>
-                <a:picLocks noChangeAspect="1"/>
-              </p:cNvPicPr>
-              <p:nvPr/>
-            </p:nvPicPr>
-            <p:blipFill>
-              <a:blip r:embed="rId21">
-                <a:extLst>
-                  <a:ext uri="{96DAC541-7B7A-43D3-8B79-37D633B846F1}">
-                    <asvg:svgBlip xmlns:asvg="http://schemas.microsoft.com/office/drawing/2016/SVG/main" r:embed="rId22"/>
-                  </a:ext>
-                </a:extLst>
-              </a:blip>
-              <a:stretch>
-                <a:fillRect/>
-              </a:stretch>
-            </p:blipFill>
-            <p:spPr>
-              <a:xfrm>
-                <a:off x="2747574" y="4220349"/>
+                <a:off x="8695944" y="1783080"/>
                 <a:ext cx="457200" cy="457200"/>
               </a:xfrm>
               <a:prstGeom prst="rect">
@@ -19319,10 +19514,10 @@
           </p:pic>
           <p:sp>
             <p:nvSpPr>
-              <p:cNvPr id="99" name="TextBox 16">
+              <p:cNvPr id="79" name="TextBox 17">
                 <a:extLst>
                   <a:ext uri="{FF2B5EF4-FFF2-40B4-BE49-F238E27FC236}">
-                    <a16:creationId xmlns:a16="http://schemas.microsoft.com/office/drawing/2014/main" id="{42E05ABE-1BB6-4752-863A-AF81F4E480E3}"/>
+                    <a16:creationId xmlns:a16="http://schemas.microsoft.com/office/drawing/2014/main" id="{B8C0971F-B147-47C1-AE55-E329BF91D76A}"/>
                   </a:ext>
                 </a:extLst>
               </p:cNvPr>
@@ -19333,8 +19528,8 @@
             </p:nvSpPr>
             <p:spPr bwMode="auto">
               <a:xfrm>
-                <a:off x="1492897" y="4625131"/>
-                <a:ext cx="1920240" cy="461665"/>
+                <a:off x="8375904" y="2203704"/>
+                <a:ext cx="1097280" cy="276999"/>
               </a:xfrm>
               <a:prstGeom prst="rect">
                 <a:avLst/>
@@ -19364,7 +19559,7 @@
               </a:extLst>
             </p:spPr>
             <p:txBody>
-              <a:bodyPr wrap="square" lIns="0" rIns="0">
+              <a:bodyPr wrap="square">
                 <a:spAutoFit/>
               </a:bodyPr>
               <a:lstStyle>
@@ -19473,18 +19668,117 @@
                     <a:ea typeface="Amazon Ember" panose="020B0603020204020204" pitchFamily="34" charset="0"/>
                     <a:cs typeface="Arial" panose="020B0604020202020204" pitchFamily="34" charset="0"/>
                   </a:rPr>
-                  <a:t>Environment and Data Lake cluster nodes</a:t>
+                  <a:t>NAT gateway</a:t>
                 </a:r>
               </a:p>
             </p:txBody>
           </p:sp>
         </p:grpSp>
+        <p:pic>
+          <p:nvPicPr>
+            <p:cNvPr id="64" name="Graphic 63">
+              <a:extLst>
+                <a:ext uri="{FF2B5EF4-FFF2-40B4-BE49-F238E27FC236}">
+                  <a16:creationId xmlns:a16="http://schemas.microsoft.com/office/drawing/2014/main" id="{F07F3ED8-229F-41A4-BE67-FD3E93F274C7}"/>
+                </a:ext>
+              </a:extLst>
+            </p:cNvPr>
+            <p:cNvPicPr>
+              <a:picLocks noChangeAspect="1"/>
+            </p:cNvPicPr>
+            <p:nvPr/>
+          </p:nvPicPr>
+          <p:blipFill>
+            <a:blip r:embed="rId13">
+              <a:extLst>
+                <a:ext uri="{96DAC541-7B7A-43D3-8B79-37D633B846F1}">
+                  <asvg:svgBlip xmlns:asvg="http://schemas.microsoft.com/office/drawing/2016/SVG/main" r:embed="rId14"/>
+                </a:ext>
+              </a:extLst>
+            </a:blip>
+            <a:srcRect/>
+            <a:stretch/>
+          </p:blipFill>
+          <p:spPr>
+            <a:xfrm>
+              <a:off x="9997440" y="4526280"/>
+              <a:ext cx="381000" cy="381000"/>
+            </a:xfrm>
+            <a:prstGeom prst="rect">
+              <a:avLst/>
+            </a:prstGeom>
+          </p:spPr>
+        </p:pic>
+        <p:sp>
+          <p:nvSpPr>
+            <p:cNvPr id="65" name="Rectangle 64">
+              <a:extLst>
+                <a:ext uri="{FF2B5EF4-FFF2-40B4-BE49-F238E27FC236}">
+                  <a16:creationId xmlns:a16="http://schemas.microsoft.com/office/drawing/2014/main" id="{E8E8DFD9-5B9B-41A0-9384-34436C7CCCDD}"/>
+                </a:ext>
+              </a:extLst>
+            </p:cNvPr>
+            <p:cNvSpPr/>
+            <p:nvPr/>
+          </p:nvSpPr>
+          <p:spPr>
+            <a:xfrm>
+              <a:off x="9997440" y="4526280"/>
+              <a:ext cx="2194560" cy="3931920"/>
+            </a:xfrm>
+            <a:prstGeom prst="rect">
+              <a:avLst/>
+            </a:prstGeom>
+            <a:noFill/>
+            <a:ln w="15875">
+              <a:solidFill>
+                <a:srgbClr val="00A4A6"/>
+              </a:solidFill>
+              <a:prstDash val="solid"/>
+            </a:ln>
+          </p:spPr>
+          <p:style>
+            <a:lnRef idx="2">
+              <a:schemeClr val="accent1">
+                <a:shade val="50000"/>
+              </a:schemeClr>
+            </a:lnRef>
+            <a:fillRef idx="1">
+              <a:schemeClr val="accent1"/>
+            </a:fillRef>
+            <a:effectRef idx="0">
+              <a:schemeClr val="accent1"/>
+            </a:effectRef>
+            <a:fontRef idx="minor">
+              <a:schemeClr val="lt1"/>
+            </a:fontRef>
+          </p:style>
+          <p:txBody>
+            <a:bodyPr lIns="502920" tIns="91440" bIns="45720"/>
+            <a:lstStyle/>
+            <a:p>
+              <a:pPr>
+                <a:defRPr/>
+              </a:pPr>
+              <a:r>
+                <a:rPr lang="en-US" sz="1200" dirty="0">
+                  <a:solidFill>
+                    <a:schemeClr val="tx1"/>
+                  </a:solidFill>
+                  <a:latin typeface="Arial" panose="020B0604020202020204" pitchFamily="34" charset="0"/>
+                  <a:cs typeface="Arial" panose="020B0604020202020204" pitchFamily="34" charset="0"/>
+                </a:rPr>
+                <a:t>Private subnet</a:t>
+              </a:r>
+            </a:p>
+          </p:txBody>
+        </p:sp>
         <p:grpSp>
           <p:nvGrpSpPr>
-            <p:cNvPr id="52" name="Group 51">
+            <p:cNvPr id="10" name="Group 9">
               <a:extLst>
                 <a:ext uri="{FF2B5EF4-FFF2-40B4-BE49-F238E27FC236}">
-                  <a16:creationId xmlns:a16="http://schemas.microsoft.com/office/drawing/2014/main" id="{73FD14BB-1A22-4D48-ADDB-BCDE18DD8A9D}"/>
+                  <a16:creationId xmlns:a16="http://schemas.microsoft.com/office/drawing/2014/main" id="{CDE5B7DC-6694-4827-BDC2-B55B42764DB4}"/>
                 </a:ext>
               </a:extLst>
             </p:cNvPr>
@@ -19493,18 +19787,18 @@
           </p:nvGrpSpPr>
           <p:grpSpPr>
             <a:xfrm>
-              <a:off x="4261318" y="3854589"/>
-              <a:ext cx="1920240" cy="868180"/>
-              <a:chOff x="1614099" y="4200920"/>
-              <a:chExt cx="1920240" cy="868180"/>
+              <a:off x="10509504" y="4846320"/>
+              <a:ext cx="1097280" cy="688479"/>
+              <a:chOff x="8375904" y="2871161"/>
+              <a:chExt cx="1097280" cy="688479"/>
             </a:xfrm>
           </p:grpSpPr>
           <p:pic>
             <p:nvPicPr>
-              <p:cNvPr id="53" name="Graphic 52">
+              <p:cNvPr id="102" name="Graphic 101">
                 <a:extLst>
                   <a:ext uri="{FF2B5EF4-FFF2-40B4-BE49-F238E27FC236}">
-                    <a16:creationId xmlns:a16="http://schemas.microsoft.com/office/drawing/2014/main" id="{E090E0E5-AB7D-4230-91D4-22AE81437CDF}"/>
+                    <a16:creationId xmlns:a16="http://schemas.microsoft.com/office/drawing/2014/main" id="{BE28528C-104F-4489-9F0B-FAB9F414B880}"/>
                   </a:ext>
                 </a:extLst>
               </p:cNvPr>
@@ -19514,10 +19808,10 @@
               <p:nvPr/>
             </p:nvPicPr>
             <p:blipFill>
-              <a:blip r:embed="rId21">
+              <a:blip r:embed="rId9">
                 <a:extLst>
                   <a:ext uri="{96DAC541-7B7A-43D3-8B79-37D633B846F1}">
-                    <asvg:svgBlip xmlns:asvg="http://schemas.microsoft.com/office/drawing/2016/SVG/main" r:embed="rId22"/>
+                    <asvg:svgBlip xmlns:asvg="http://schemas.microsoft.com/office/drawing/2016/SVG/main" r:embed="rId10"/>
                   </a:ext>
                 </a:extLst>
               </a:blip>
@@ -19527,79 +19821,7 @@
             </p:blipFill>
             <p:spPr>
               <a:xfrm>
-                <a:off x="2345619" y="4207871"/>
-                <a:ext cx="457200" cy="457200"/>
-              </a:xfrm>
-              <a:prstGeom prst="rect">
-                <a:avLst/>
-              </a:prstGeom>
-            </p:spPr>
-          </p:pic>
-          <p:pic>
-            <p:nvPicPr>
-              <p:cNvPr id="54" name="Graphic 53">
-                <a:extLst>
-                  <a:ext uri="{FF2B5EF4-FFF2-40B4-BE49-F238E27FC236}">
-                    <a16:creationId xmlns:a16="http://schemas.microsoft.com/office/drawing/2014/main" id="{60BF164B-742B-4C8D-857F-D0567BBED59F}"/>
-                  </a:ext>
-                </a:extLst>
-              </p:cNvPr>
-              <p:cNvPicPr>
-                <a:picLocks noChangeAspect="1"/>
-              </p:cNvPicPr>
-              <p:nvPr/>
-            </p:nvPicPr>
-            <p:blipFill>
-              <a:blip r:embed="rId21">
-                <a:extLst>
-                  <a:ext uri="{96DAC541-7B7A-43D3-8B79-37D633B846F1}">
-                    <asvg:svgBlip xmlns:asvg="http://schemas.microsoft.com/office/drawing/2016/SVG/main" r:embed="rId22"/>
-                  </a:ext>
-                </a:extLst>
-              </a:blip>
-              <a:stretch>
-                <a:fillRect/>
-              </a:stretch>
-            </p:blipFill>
-            <p:spPr>
-              <a:xfrm>
-                <a:off x="1828800" y="4208092"/>
-                <a:ext cx="457200" cy="457200"/>
-              </a:xfrm>
-              <a:prstGeom prst="rect">
-                <a:avLst/>
-              </a:prstGeom>
-            </p:spPr>
-          </p:pic>
-          <p:pic>
-            <p:nvPicPr>
-              <p:cNvPr id="55" name="Graphic 54">
-                <a:extLst>
-                  <a:ext uri="{FF2B5EF4-FFF2-40B4-BE49-F238E27FC236}">
-                    <a16:creationId xmlns:a16="http://schemas.microsoft.com/office/drawing/2014/main" id="{03EC3B06-9B9E-4C97-99DC-C0374387E938}"/>
-                  </a:ext>
-                </a:extLst>
-              </p:cNvPr>
-              <p:cNvPicPr>
-                <a:picLocks noChangeAspect="1"/>
-              </p:cNvPicPr>
-              <p:nvPr/>
-            </p:nvPicPr>
-            <p:blipFill>
-              <a:blip r:embed="rId21">
-                <a:extLst>
-                  <a:ext uri="{96DAC541-7B7A-43D3-8B79-37D633B846F1}">
-                    <asvg:svgBlip xmlns:asvg="http://schemas.microsoft.com/office/drawing/2016/SVG/main" r:embed="rId22"/>
-                  </a:ext>
-                </a:extLst>
-              </a:blip>
-              <a:stretch>
-                <a:fillRect/>
-              </a:stretch>
-            </p:blipFill>
-            <p:spPr>
-              <a:xfrm>
-                <a:off x="2849881" y="4200920"/>
+                <a:off x="8695944" y="2871161"/>
                 <a:ext cx="457200" cy="457200"/>
               </a:xfrm>
               <a:prstGeom prst="rect">
@@ -19609,10 +19831,10 @@
           </p:pic>
           <p:sp>
             <p:nvSpPr>
-              <p:cNvPr id="56" name="TextBox 16">
+              <p:cNvPr id="114" name="TextBox 17">
                 <a:extLst>
                   <a:ext uri="{FF2B5EF4-FFF2-40B4-BE49-F238E27FC236}">
-                    <a16:creationId xmlns:a16="http://schemas.microsoft.com/office/drawing/2014/main" id="{79C81D3E-38B8-401B-9203-E054B052BDFB}"/>
+                    <a16:creationId xmlns:a16="http://schemas.microsoft.com/office/drawing/2014/main" id="{F5F0BB06-18FF-4263-A04B-5A71AB5ABE54}"/>
                   </a:ext>
                 </a:extLst>
               </p:cNvPr>
@@ -19623,8 +19845,8 @@
             </p:nvSpPr>
             <p:spPr bwMode="auto">
               <a:xfrm>
-                <a:off x="1614099" y="4607435"/>
-                <a:ext cx="1920240" cy="461665"/>
+                <a:off x="8375904" y="3282641"/>
+                <a:ext cx="1097280" cy="276999"/>
               </a:xfrm>
               <a:prstGeom prst="rect">
                 <a:avLst/>
@@ -19654,7 +19876,7 @@
               </a:extLst>
             </p:spPr>
             <p:txBody>
-              <a:bodyPr wrap="square" lIns="0" rIns="0">
+              <a:bodyPr wrap="square">
                 <a:spAutoFit/>
               </a:bodyPr>
               <a:lstStyle>
@@ -19763,619 +19985,12 @@
                     <a:ea typeface="Amazon Ember" panose="020B0603020204020204" pitchFamily="34" charset="0"/>
                     <a:cs typeface="Arial" panose="020B0604020202020204" pitchFamily="34" charset="0"/>
                   </a:rPr>
-                  <a:t>Environment and Data Lake cluster nodes</a:t>
+                  <a:t>NAT gateway</a:t>
                 </a:r>
               </a:p>
             </p:txBody>
           </p:sp>
         </p:grpSp>
-        <p:grpSp>
-          <p:nvGrpSpPr>
-            <p:cNvPr id="57" name="Group 56">
-              <a:extLst>
-                <a:ext uri="{FF2B5EF4-FFF2-40B4-BE49-F238E27FC236}">
-                  <a16:creationId xmlns:a16="http://schemas.microsoft.com/office/drawing/2014/main" id="{853D9613-DCB9-43E6-85DB-AF288E7813B3}"/>
-                </a:ext>
-              </a:extLst>
-            </p:cNvPr>
-            <p:cNvGrpSpPr/>
-            <p:nvPr/>
-          </p:nvGrpSpPr>
-          <p:grpSpPr>
-            <a:xfrm>
-              <a:off x="7973568" y="3849624"/>
-              <a:ext cx="1920240" cy="873145"/>
-              <a:chOff x="1535204" y="4194103"/>
-              <a:chExt cx="1920240" cy="873145"/>
-            </a:xfrm>
-          </p:grpSpPr>
-          <p:pic>
-            <p:nvPicPr>
-              <p:cNvPr id="58" name="Graphic 57">
-                <a:extLst>
-                  <a:ext uri="{FF2B5EF4-FFF2-40B4-BE49-F238E27FC236}">
-                    <a16:creationId xmlns:a16="http://schemas.microsoft.com/office/drawing/2014/main" id="{A2926407-4CFB-40DD-822A-5A4AC506ACB2}"/>
-                  </a:ext>
-                </a:extLst>
-              </p:cNvPr>
-              <p:cNvPicPr>
-                <a:picLocks noChangeAspect="1"/>
-              </p:cNvPicPr>
-              <p:nvPr/>
-            </p:nvPicPr>
-            <p:blipFill>
-              <a:blip r:embed="rId21">
-                <a:extLst>
-                  <a:ext uri="{96DAC541-7B7A-43D3-8B79-37D633B846F1}">
-                    <asvg:svgBlip xmlns:asvg="http://schemas.microsoft.com/office/drawing/2016/SVG/main" r:embed="rId22"/>
-                  </a:ext>
-                </a:extLst>
-              </a:blip>
-              <a:stretch>
-                <a:fillRect/>
-              </a:stretch>
-            </p:blipFill>
-            <p:spPr>
-              <a:xfrm>
-                <a:off x="2259609" y="4194103"/>
-                <a:ext cx="457200" cy="457200"/>
-              </a:xfrm>
-              <a:prstGeom prst="rect">
-                <a:avLst/>
-              </a:prstGeom>
-            </p:spPr>
-          </p:pic>
-          <p:pic>
-            <p:nvPicPr>
-              <p:cNvPr id="59" name="Graphic 58">
-                <a:extLst>
-                  <a:ext uri="{FF2B5EF4-FFF2-40B4-BE49-F238E27FC236}">
-                    <a16:creationId xmlns:a16="http://schemas.microsoft.com/office/drawing/2014/main" id="{640522B5-F4B6-49F2-87D7-D95BDB68DB14}"/>
-                  </a:ext>
-                </a:extLst>
-              </p:cNvPr>
-              <p:cNvPicPr>
-                <a:picLocks noChangeAspect="1"/>
-              </p:cNvPicPr>
-              <p:nvPr/>
-            </p:nvPicPr>
-            <p:blipFill>
-              <a:blip r:embed="rId21">
-                <a:extLst>
-                  <a:ext uri="{96DAC541-7B7A-43D3-8B79-37D633B846F1}">
-                    <asvg:svgBlip xmlns:asvg="http://schemas.microsoft.com/office/drawing/2016/SVG/main" r:embed="rId22"/>
-                  </a:ext>
-                </a:extLst>
-              </a:blip>
-              <a:stretch>
-                <a:fillRect/>
-              </a:stretch>
-            </p:blipFill>
-            <p:spPr>
-              <a:xfrm>
-                <a:off x="1745516" y="4206019"/>
-                <a:ext cx="457200" cy="457200"/>
-              </a:xfrm>
-              <a:prstGeom prst="rect">
-                <a:avLst/>
-              </a:prstGeom>
-            </p:spPr>
-          </p:pic>
-          <p:pic>
-            <p:nvPicPr>
-              <p:cNvPr id="60" name="Graphic 59">
-                <a:extLst>
-                  <a:ext uri="{FF2B5EF4-FFF2-40B4-BE49-F238E27FC236}">
-                    <a16:creationId xmlns:a16="http://schemas.microsoft.com/office/drawing/2014/main" id="{9A06C942-377A-4552-9ED8-F4C742292733}"/>
-                  </a:ext>
-                </a:extLst>
-              </p:cNvPr>
-              <p:cNvPicPr>
-                <a:picLocks noChangeAspect="1"/>
-              </p:cNvPicPr>
-              <p:nvPr/>
-            </p:nvPicPr>
-            <p:blipFill>
-              <a:blip r:embed="rId21">
-                <a:extLst>
-                  <a:ext uri="{96DAC541-7B7A-43D3-8B79-37D633B846F1}">
-                    <asvg:svgBlip xmlns:asvg="http://schemas.microsoft.com/office/drawing/2016/SVG/main" r:embed="rId22"/>
-                  </a:ext>
-                </a:extLst>
-              </a:blip>
-              <a:stretch>
-                <a:fillRect/>
-              </a:stretch>
-            </p:blipFill>
-            <p:spPr>
-              <a:xfrm>
-                <a:off x="2769581" y="4206019"/>
-                <a:ext cx="457200" cy="457200"/>
-              </a:xfrm>
-              <a:prstGeom prst="rect">
-                <a:avLst/>
-              </a:prstGeom>
-            </p:spPr>
-          </p:pic>
-          <p:sp>
-            <p:nvSpPr>
-              <p:cNvPr id="61" name="TextBox 16">
-                <a:extLst>
-                  <a:ext uri="{FF2B5EF4-FFF2-40B4-BE49-F238E27FC236}">
-                    <a16:creationId xmlns:a16="http://schemas.microsoft.com/office/drawing/2014/main" id="{A995FF07-7FA1-46C9-98A2-E9DC2E8585AE}"/>
-                  </a:ext>
-                </a:extLst>
-              </p:cNvPr>
-              <p:cNvSpPr txBox="1">
-                <a:spLocks noChangeArrowheads="1"/>
-              </p:cNvSpPr>
-              <p:nvPr/>
-            </p:nvSpPr>
-            <p:spPr bwMode="auto">
-              <a:xfrm>
-                <a:off x="1535204" y="4605583"/>
-                <a:ext cx="1920240" cy="461665"/>
-              </a:xfrm>
-              <a:prstGeom prst="rect">
-                <a:avLst/>
-              </a:prstGeom>
-              <a:noFill/>
-              <a:ln>
-                <a:noFill/>
-              </a:ln>
-              <a:extLst>
-                <a:ext uri="{909E8E84-426E-40DD-AFC4-6F175D3DCCD1}">
-                  <a14:hiddenFill xmlns:a14="http://schemas.microsoft.com/office/drawing/2010/main">
-                    <a:solidFill>
-                      <a:srgbClr val="FFFFFF"/>
-                    </a:solidFill>
-                  </a14:hiddenFill>
-                </a:ext>
-                <a:ext uri="{91240B29-F687-4F45-9708-019B960494DF}">
-                  <a14:hiddenLine xmlns:a14="http://schemas.microsoft.com/office/drawing/2010/main" w="9525">
-                    <a:solidFill>
-                      <a:srgbClr val="000000"/>
-                    </a:solidFill>
-                    <a:miter lim="800000"/>
-                    <a:headEnd/>
-                    <a:tailEnd/>
-                  </a14:hiddenLine>
-                </a:ext>
-              </a:extLst>
-            </p:spPr>
-            <p:txBody>
-              <a:bodyPr wrap="square" lIns="0" rIns="0">
-                <a:spAutoFit/>
-              </a:bodyPr>
-              <a:lstStyle>
-                <a:lvl1pPr>
-                  <a:defRPr>
-                    <a:solidFill>
-                      <a:schemeClr val="tx1"/>
-                    </a:solidFill>
-                    <a:latin typeface="Calibri" panose="020F0502020204030204" pitchFamily="34" charset="0"/>
-                  </a:defRPr>
-                </a:lvl1pPr>
-                <a:lvl2pPr marL="742950" indent="-285750">
-                  <a:defRPr>
-                    <a:solidFill>
-                      <a:schemeClr val="tx1"/>
-                    </a:solidFill>
-                    <a:latin typeface="Calibri" panose="020F0502020204030204" pitchFamily="34" charset="0"/>
-                  </a:defRPr>
-                </a:lvl2pPr>
-                <a:lvl3pPr marL="1143000" indent="-228600">
-                  <a:defRPr>
-                    <a:solidFill>
-                      <a:schemeClr val="tx1"/>
-                    </a:solidFill>
-                    <a:latin typeface="Calibri" panose="020F0502020204030204" pitchFamily="34" charset="0"/>
-                  </a:defRPr>
-                </a:lvl3pPr>
-                <a:lvl4pPr marL="1600200" indent="-228600">
-                  <a:defRPr>
-                    <a:solidFill>
-                      <a:schemeClr val="tx1"/>
-                    </a:solidFill>
-                    <a:latin typeface="Calibri" panose="020F0502020204030204" pitchFamily="34" charset="0"/>
-                  </a:defRPr>
-                </a:lvl4pPr>
-                <a:lvl5pPr marL="2057400" indent="-228600">
-                  <a:defRPr>
-                    <a:solidFill>
-                      <a:schemeClr val="tx1"/>
-                    </a:solidFill>
-                    <a:latin typeface="Calibri" panose="020F0502020204030204" pitchFamily="34" charset="0"/>
-                  </a:defRPr>
-                </a:lvl5pPr>
-                <a:lvl6pPr marL="2514600" indent="-228600" eaLnBrk="0" fontAlgn="base" hangingPunct="0">
-                  <a:spcBef>
-                    <a:spcPct val="0"/>
-                  </a:spcBef>
-                  <a:spcAft>
-                    <a:spcPct val="0"/>
-                  </a:spcAft>
-                  <a:defRPr>
-                    <a:solidFill>
-                      <a:schemeClr val="tx1"/>
-                    </a:solidFill>
-                    <a:latin typeface="Calibri" panose="020F0502020204030204" pitchFamily="34" charset="0"/>
-                  </a:defRPr>
-                </a:lvl6pPr>
-                <a:lvl7pPr marL="2971800" indent="-228600" eaLnBrk="0" fontAlgn="base" hangingPunct="0">
-                  <a:spcBef>
-                    <a:spcPct val="0"/>
-                  </a:spcBef>
-                  <a:spcAft>
-                    <a:spcPct val="0"/>
-                  </a:spcAft>
-                  <a:defRPr>
-                    <a:solidFill>
-                      <a:schemeClr val="tx1"/>
-                    </a:solidFill>
-                    <a:latin typeface="Calibri" panose="020F0502020204030204" pitchFamily="34" charset="0"/>
-                  </a:defRPr>
-                </a:lvl7pPr>
-                <a:lvl8pPr marL="3429000" indent="-228600" eaLnBrk="0" fontAlgn="base" hangingPunct="0">
-                  <a:spcBef>
-                    <a:spcPct val="0"/>
-                  </a:spcBef>
-                  <a:spcAft>
-                    <a:spcPct val="0"/>
-                  </a:spcAft>
-                  <a:defRPr>
-                    <a:solidFill>
-                      <a:schemeClr val="tx1"/>
-                    </a:solidFill>
-                    <a:latin typeface="Calibri" panose="020F0502020204030204" pitchFamily="34" charset="0"/>
-                  </a:defRPr>
-                </a:lvl8pPr>
-                <a:lvl9pPr marL="3886200" indent="-228600" eaLnBrk="0" fontAlgn="base" hangingPunct="0">
-                  <a:spcBef>
-                    <a:spcPct val="0"/>
-                  </a:spcBef>
-                  <a:spcAft>
-                    <a:spcPct val="0"/>
-                  </a:spcAft>
-                  <a:defRPr>
-                    <a:solidFill>
-                      <a:schemeClr val="tx1"/>
-                    </a:solidFill>
-                    <a:latin typeface="Calibri" panose="020F0502020204030204" pitchFamily="34" charset="0"/>
-                  </a:defRPr>
-                </a:lvl9pPr>
-              </a:lstStyle>
-              <a:p>
-                <a:pPr algn="ctr" eaLnBrk="1" hangingPunct="1"/>
-                <a:r>
-                  <a:rPr lang="en-US" altLang="en-US" sz="1200" dirty="0">
-                    <a:latin typeface="Arial" panose="020B0604020202020204" pitchFamily="34" charset="0"/>
-                    <a:ea typeface="Amazon Ember" panose="020B0603020204020204" pitchFamily="34" charset="0"/>
-                    <a:cs typeface="Arial" panose="020B0604020202020204" pitchFamily="34" charset="0"/>
-                  </a:rPr>
-                  <a:t>Environment and Data Lake cluster nodes</a:t>
-                </a:r>
-              </a:p>
-            </p:txBody>
-          </p:sp>
-        </p:grpSp>
-      </p:grpSp>
-      <p:pic>
-        <p:nvPicPr>
-          <p:cNvPr id="64" name="Graphic 63">
-            <a:extLst>
-              <a:ext uri="{FF2B5EF4-FFF2-40B4-BE49-F238E27FC236}">
-                <a16:creationId xmlns:a16="http://schemas.microsoft.com/office/drawing/2014/main" id="{F07F3ED8-229F-41A4-BE67-FD3E93F274C7}"/>
-              </a:ext>
-            </a:extLst>
-          </p:cNvPr>
-          <p:cNvPicPr>
-            <a:picLocks noChangeAspect="1"/>
-          </p:cNvPicPr>
-          <p:nvPr/>
-        </p:nvPicPr>
-        <p:blipFill>
-          <a:blip r:embed="rId13">
-            <a:extLst>
-              <a:ext uri="{96DAC541-7B7A-43D3-8B79-37D633B846F1}">
-                <asvg:svgBlip xmlns:asvg="http://schemas.microsoft.com/office/drawing/2016/SVG/main" r:embed="rId14"/>
-              </a:ext>
-            </a:extLst>
-          </a:blip>
-          <a:srcRect/>
-          <a:stretch/>
-        </p:blipFill>
-        <p:spPr>
-          <a:xfrm>
-            <a:off x="7863840" y="2468880"/>
-            <a:ext cx="381000" cy="381000"/>
-          </a:xfrm>
-          <a:prstGeom prst="rect">
-            <a:avLst/>
-          </a:prstGeom>
-        </p:spPr>
-      </p:pic>
-      <p:sp>
-        <p:nvSpPr>
-          <p:cNvPr id="65" name="Rectangle 64">
-            <a:extLst>
-              <a:ext uri="{FF2B5EF4-FFF2-40B4-BE49-F238E27FC236}">
-                <a16:creationId xmlns:a16="http://schemas.microsoft.com/office/drawing/2014/main" id="{E8E8DFD9-5B9B-41A0-9384-34436C7CCCDD}"/>
-              </a:ext>
-            </a:extLst>
-          </p:cNvPr>
-          <p:cNvSpPr/>
-          <p:nvPr/>
-        </p:nvSpPr>
-        <p:spPr>
-          <a:xfrm>
-            <a:off x="7863840" y="2468880"/>
-            <a:ext cx="2194560" cy="3383280"/>
-          </a:xfrm>
-          <a:prstGeom prst="rect">
-            <a:avLst/>
-          </a:prstGeom>
-          <a:noFill/>
-          <a:ln w="15875">
-            <a:solidFill>
-              <a:srgbClr val="00A4A6"/>
-            </a:solidFill>
-            <a:prstDash val="solid"/>
-          </a:ln>
-        </p:spPr>
-        <p:style>
-          <a:lnRef idx="2">
-            <a:schemeClr val="accent1">
-              <a:shade val="50000"/>
-            </a:schemeClr>
-          </a:lnRef>
-          <a:fillRef idx="1">
-            <a:schemeClr val="accent1"/>
-          </a:fillRef>
-          <a:effectRef idx="0">
-            <a:schemeClr val="accent1"/>
-          </a:effectRef>
-          <a:fontRef idx="minor">
-            <a:schemeClr val="lt1"/>
-          </a:fontRef>
-        </p:style>
-        <p:txBody>
-          <a:bodyPr lIns="502920" tIns="91440" bIns="45720"/>
-          <a:lstStyle/>
-          <a:p>
-            <a:pPr>
-              <a:defRPr/>
-            </a:pPr>
-            <a:r>
-              <a:rPr lang="en-US" sz="1200" dirty="0">
-                <a:solidFill>
-                  <a:schemeClr val="tx1"/>
-                </a:solidFill>
-                <a:latin typeface="Arial" panose="020B0604020202020204" pitchFamily="34" charset="0"/>
-                <a:cs typeface="Arial" panose="020B0604020202020204" pitchFamily="34" charset="0"/>
-              </a:rPr>
-              <a:t>Private subnet</a:t>
-            </a:r>
-          </a:p>
-        </p:txBody>
-      </p:sp>
-      <p:grpSp>
-        <p:nvGrpSpPr>
-          <p:cNvPr id="10" name="Group 9">
-            <a:extLst>
-              <a:ext uri="{FF2B5EF4-FFF2-40B4-BE49-F238E27FC236}">
-                <a16:creationId xmlns:a16="http://schemas.microsoft.com/office/drawing/2014/main" id="{CDE5B7DC-6694-4827-BDC2-B55B42764DB4}"/>
-              </a:ext>
-            </a:extLst>
-          </p:cNvPr>
-          <p:cNvGrpSpPr/>
-          <p:nvPr/>
-        </p:nvGrpSpPr>
-        <p:grpSpPr>
-          <a:xfrm>
-            <a:off x="8375904" y="2788920"/>
-            <a:ext cx="1097280" cy="651958"/>
-            <a:chOff x="8375904" y="2871161"/>
-            <a:chExt cx="1097280" cy="651958"/>
-          </a:xfrm>
-        </p:grpSpPr>
-        <p:pic>
-          <p:nvPicPr>
-            <p:cNvPr id="102" name="Graphic 101">
-              <a:extLst>
-                <a:ext uri="{FF2B5EF4-FFF2-40B4-BE49-F238E27FC236}">
-                  <a16:creationId xmlns:a16="http://schemas.microsoft.com/office/drawing/2014/main" id="{BE28528C-104F-4489-9F0B-FAB9F414B880}"/>
-                </a:ext>
-              </a:extLst>
-            </p:cNvPr>
-            <p:cNvPicPr>
-              <a:picLocks noChangeAspect="1"/>
-            </p:cNvPicPr>
-            <p:nvPr/>
-          </p:nvPicPr>
-          <p:blipFill>
-            <a:blip r:embed="rId9">
-              <a:extLst>
-                <a:ext uri="{96DAC541-7B7A-43D3-8B79-37D633B846F1}">
-                  <asvg:svgBlip xmlns:asvg="http://schemas.microsoft.com/office/drawing/2016/SVG/main" r:embed="rId10"/>
-                </a:ext>
-              </a:extLst>
-            </a:blip>
-            <a:stretch>
-              <a:fillRect/>
-            </a:stretch>
-          </p:blipFill>
-          <p:spPr>
-            <a:xfrm>
-              <a:off x="8695944" y="2871161"/>
-              <a:ext cx="457200" cy="457200"/>
-            </a:xfrm>
-            <a:prstGeom prst="rect">
-              <a:avLst/>
-            </a:prstGeom>
-          </p:spPr>
-        </p:pic>
-        <p:sp>
-          <p:nvSpPr>
-            <p:cNvPr id="114" name="TextBox 17">
-              <a:extLst>
-                <a:ext uri="{FF2B5EF4-FFF2-40B4-BE49-F238E27FC236}">
-                  <a16:creationId xmlns:a16="http://schemas.microsoft.com/office/drawing/2014/main" id="{F5F0BB06-18FF-4263-A04B-5A71AB5ABE54}"/>
-                </a:ext>
-              </a:extLst>
-            </p:cNvPr>
-            <p:cNvSpPr txBox="1">
-              <a:spLocks noChangeArrowheads="1"/>
-            </p:cNvSpPr>
-            <p:nvPr/>
-          </p:nvSpPr>
-          <p:spPr bwMode="auto">
-            <a:xfrm>
-              <a:off x="8375904" y="3246120"/>
-              <a:ext cx="1097280" cy="276999"/>
-            </a:xfrm>
-            <a:prstGeom prst="rect">
-              <a:avLst/>
-            </a:prstGeom>
-            <a:noFill/>
-            <a:ln>
-              <a:noFill/>
-            </a:ln>
-            <a:extLst>
-              <a:ext uri="{909E8E84-426E-40DD-AFC4-6F175D3DCCD1}">
-                <a14:hiddenFill xmlns:a14="http://schemas.microsoft.com/office/drawing/2010/main">
-                  <a:solidFill>
-                    <a:srgbClr val="FFFFFF"/>
-                  </a:solidFill>
-                </a14:hiddenFill>
-              </a:ext>
-              <a:ext uri="{91240B29-F687-4F45-9708-019B960494DF}">
-                <a14:hiddenLine xmlns:a14="http://schemas.microsoft.com/office/drawing/2010/main" w="9525">
-                  <a:solidFill>
-                    <a:srgbClr val="000000"/>
-                  </a:solidFill>
-                  <a:miter lim="800000"/>
-                  <a:headEnd/>
-                  <a:tailEnd/>
-                </a14:hiddenLine>
-              </a:ext>
-            </a:extLst>
-          </p:spPr>
-          <p:txBody>
-            <a:bodyPr wrap="square">
-              <a:spAutoFit/>
-            </a:bodyPr>
-            <a:lstStyle>
-              <a:lvl1pPr>
-                <a:defRPr>
-                  <a:solidFill>
-                    <a:schemeClr val="tx1"/>
-                  </a:solidFill>
-                  <a:latin typeface="Calibri" panose="020F0502020204030204" pitchFamily="34" charset="0"/>
-                </a:defRPr>
-              </a:lvl1pPr>
-              <a:lvl2pPr marL="742950" indent="-285750">
-                <a:defRPr>
-                  <a:solidFill>
-                    <a:schemeClr val="tx1"/>
-                  </a:solidFill>
-                  <a:latin typeface="Calibri" panose="020F0502020204030204" pitchFamily="34" charset="0"/>
-                </a:defRPr>
-              </a:lvl2pPr>
-              <a:lvl3pPr marL="1143000" indent="-228600">
-                <a:defRPr>
-                  <a:solidFill>
-                    <a:schemeClr val="tx1"/>
-                  </a:solidFill>
-                  <a:latin typeface="Calibri" panose="020F0502020204030204" pitchFamily="34" charset="0"/>
-                </a:defRPr>
-              </a:lvl3pPr>
-              <a:lvl4pPr marL="1600200" indent="-228600">
-                <a:defRPr>
-                  <a:solidFill>
-                    <a:schemeClr val="tx1"/>
-                  </a:solidFill>
-                  <a:latin typeface="Calibri" panose="020F0502020204030204" pitchFamily="34" charset="0"/>
-                </a:defRPr>
-              </a:lvl4pPr>
-              <a:lvl5pPr marL="2057400" indent="-228600">
-                <a:defRPr>
-                  <a:solidFill>
-                    <a:schemeClr val="tx1"/>
-                  </a:solidFill>
-                  <a:latin typeface="Calibri" panose="020F0502020204030204" pitchFamily="34" charset="0"/>
-                </a:defRPr>
-              </a:lvl5pPr>
-              <a:lvl6pPr marL="2514600" indent="-228600" eaLnBrk="0" fontAlgn="base" hangingPunct="0">
-                <a:spcBef>
-                  <a:spcPct val="0"/>
-                </a:spcBef>
-                <a:spcAft>
-                  <a:spcPct val="0"/>
-                </a:spcAft>
-                <a:defRPr>
-                  <a:solidFill>
-                    <a:schemeClr val="tx1"/>
-                  </a:solidFill>
-                  <a:latin typeface="Calibri" panose="020F0502020204030204" pitchFamily="34" charset="0"/>
-                </a:defRPr>
-              </a:lvl6pPr>
-              <a:lvl7pPr marL="2971800" indent="-228600" eaLnBrk="0" fontAlgn="base" hangingPunct="0">
-                <a:spcBef>
-                  <a:spcPct val="0"/>
-                </a:spcBef>
-                <a:spcAft>
-                  <a:spcPct val="0"/>
-                </a:spcAft>
-                <a:defRPr>
-                  <a:solidFill>
-                    <a:schemeClr val="tx1"/>
-                  </a:solidFill>
-                  <a:latin typeface="Calibri" panose="020F0502020204030204" pitchFamily="34" charset="0"/>
-                </a:defRPr>
-              </a:lvl7pPr>
-              <a:lvl8pPr marL="3429000" indent="-228600" eaLnBrk="0" fontAlgn="base" hangingPunct="0">
-                <a:spcBef>
-                  <a:spcPct val="0"/>
-                </a:spcBef>
-                <a:spcAft>
-                  <a:spcPct val="0"/>
-                </a:spcAft>
-                <a:defRPr>
-                  <a:solidFill>
-                    <a:schemeClr val="tx1"/>
-                  </a:solidFill>
-                  <a:latin typeface="Calibri" panose="020F0502020204030204" pitchFamily="34" charset="0"/>
-                </a:defRPr>
-              </a:lvl8pPr>
-              <a:lvl9pPr marL="3886200" indent="-228600" eaLnBrk="0" fontAlgn="base" hangingPunct="0">
-                <a:spcBef>
-                  <a:spcPct val="0"/>
-                </a:spcBef>
-                <a:spcAft>
-                  <a:spcPct val="0"/>
-                </a:spcAft>
-                <a:defRPr>
-                  <a:solidFill>
-                    <a:schemeClr val="tx1"/>
-                  </a:solidFill>
-                  <a:latin typeface="Calibri" panose="020F0502020204030204" pitchFamily="34" charset="0"/>
-                </a:defRPr>
-              </a:lvl9pPr>
-            </a:lstStyle>
-            <a:p>
-              <a:pPr algn="ctr" eaLnBrk="1" hangingPunct="1"/>
-              <a:r>
-                <a:rPr lang="en-US" altLang="en-US" sz="1200" dirty="0">
-                  <a:latin typeface="Arial" panose="020B0604020202020204" pitchFamily="34" charset="0"/>
-                  <a:ea typeface="Amazon Ember" panose="020B0603020204020204" pitchFamily="34" charset="0"/>
-                  <a:cs typeface="Arial" panose="020B0604020202020204" pitchFamily="34" charset="0"/>
-                </a:rPr>
-                <a:t>NAT gateway</a:t>
-              </a:r>
-            </a:p>
-          </p:txBody>
-        </p:sp>
       </p:grpSp>
       <p:grpSp>
         <p:nvGrpSpPr>
@@ -20391,7 +20006,7 @@
         </p:nvGrpSpPr>
         <p:grpSpPr>
           <a:xfrm>
-            <a:off x="10332720" y="822960"/>
+            <a:off x="11216640" y="1371601"/>
             <a:ext cx="1005840" cy="1053331"/>
             <a:chOff x="10972800" y="458108"/>
             <a:chExt cx="1005840" cy="1053331"/>
@@ -20412,10 +20027,10 @@
             <p:nvPr/>
           </p:nvPicPr>
           <p:blipFill>
-            <a:blip r:embed="rId23">
+            <a:blip r:embed="rId21">
               <a:extLst>
                 <a:ext uri="{96DAC541-7B7A-43D3-8B79-37D633B846F1}">
-                  <asvg:svgBlip xmlns:asvg="http://schemas.microsoft.com/office/drawing/2016/SVG/main" r:embed="rId24"/>
+                  <asvg:svgBlip xmlns:asvg="http://schemas.microsoft.com/office/drawing/2016/SVG/main" r:embed="rId22"/>
                 </a:ext>
               </a:extLst>
             </a:blip>
@@ -20631,7 +20246,7 @@
         </p:nvGrpSpPr>
         <p:grpSpPr>
           <a:xfrm>
-            <a:off x="10378440" y="2011680"/>
+            <a:off x="11308080" y="2560321"/>
             <a:ext cx="914400" cy="1054239"/>
             <a:chOff x="11018520" y="1737360"/>
             <a:chExt cx="914400" cy="1054239"/>
@@ -20652,10 +20267,10 @@
             <p:nvPr/>
           </p:nvPicPr>
           <p:blipFill>
-            <a:blip r:embed="rId25">
+            <a:blip r:embed="rId23">
               <a:extLst>
                 <a:ext uri="{96DAC541-7B7A-43D3-8B79-37D633B846F1}">
-                  <asvg:svgBlip xmlns:asvg="http://schemas.microsoft.com/office/drawing/2016/SVG/main" r:embed="rId26"/>
+                  <asvg:svgBlip xmlns:asvg="http://schemas.microsoft.com/office/drawing/2016/SVG/main" r:embed="rId24"/>
                 </a:ext>
               </a:extLst>
             </a:blip>
@@ -20857,6 +20472,184 @@
           </p:txBody>
         </p:sp>
       </p:grpSp>
+      <p:sp>
+        <p:nvSpPr>
+          <p:cNvPr id="119" name="Rectangle 118">
+            <a:extLst>
+              <a:ext uri="{FF2B5EF4-FFF2-40B4-BE49-F238E27FC236}">
+                <a16:creationId xmlns:a16="http://schemas.microsoft.com/office/drawing/2014/main" id="{04680BE2-3EC8-4280-A038-FE47522FF24C}"/>
+              </a:ext>
+            </a:extLst>
+          </p:cNvPr>
+          <p:cNvSpPr/>
+          <p:nvPr/>
+        </p:nvSpPr>
+        <p:spPr>
+          <a:xfrm>
+            <a:off x="2282952" y="5532120"/>
+            <a:ext cx="6309360" cy="1280160"/>
+          </a:xfrm>
+          <a:prstGeom prst="rect">
+            <a:avLst/>
+          </a:prstGeom>
+          <a:noFill/>
+          <a:ln w="15875">
+            <a:solidFill>
+              <a:srgbClr val="CA24D1"/>
+            </a:solidFill>
+            <a:prstDash val="dash"/>
+          </a:ln>
+        </p:spPr>
+        <p:style>
+          <a:lnRef idx="2">
+            <a:schemeClr val="accent1">
+              <a:shade val="50000"/>
+            </a:schemeClr>
+          </a:lnRef>
+          <a:fillRef idx="1">
+            <a:schemeClr val="accent1"/>
+          </a:fillRef>
+          <a:effectRef idx="0">
+            <a:schemeClr val="accent1"/>
+          </a:effectRef>
+          <a:fontRef idx="minor">
+            <a:schemeClr val="lt1"/>
+          </a:fontRef>
+        </p:style>
+        <p:txBody>
+          <a:bodyPr tIns="91440"/>
+          <a:lstStyle/>
+          <a:p>
+            <a:pPr algn="ctr" eaLnBrk="1" fontAlgn="auto" hangingPunct="1">
+              <a:spcBef>
+                <a:spcPts val="0"/>
+              </a:spcBef>
+              <a:spcAft>
+                <a:spcPts val="0"/>
+              </a:spcAft>
+              <a:defRPr/>
+            </a:pPr>
+            <a:r>
+              <a:rPr lang="en-US" sz="1200" dirty="0">
+                <a:solidFill>
+                  <a:schemeClr val="tx1"/>
+                </a:solidFill>
+                <a:latin typeface="Arial" panose="020B0604020202020204" pitchFamily="34" charset="0"/>
+                <a:cs typeface="Arial" panose="020B0604020202020204" pitchFamily="34" charset="0"/>
+              </a:rPr>
+              <a:t>                                                                                                             Amazon RDS group</a:t>
+            </a:r>
+          </a:p>
+        </p:txBody>
+      </p:sp>
+      <p:pic>
+        <p:nvPicPr>
+          <p:cNvPr id="88" name="Graphic 87">
+            <a:extLst>
+              <a:ext uri="{FF2B5EF4-FFF2-40B4-BE49-F238E27FC236}">
+                <a16:creationId xmlns:a16="http://schemas.microsoft.com/office/drawing/2014/main" id="{93D24BAE-968B-4F22-A156-D0BA9934D2CE}"/>
+              </a:ext>
+            </a:extLst>
+          </p:cNvPr>
+          <p:cNvPicPr>
+            <a:picLocks noChangeAspect="1"/>
+          </p:cNvPicPr>
+          <p:nvPr/>
+        </p:nvPicPr>
+        <p:blipFill>
+          <a:blip r:embed="rId25">
+            <a:extLst>
+              <a:ext uri="{96DAC541-7B7A-43D3-8B79-37D633B846F1}">
+                <asvg:svgBlip xmlns:asvg="http://schemas.microsoft.com/office/drawing/2016/SVG/main" r:embed="rId26"/>
+              </a:ext>
+            </a:extLst>
+          </a:blip>
+          <a:stretch>
+            <a:fillRect/>
+          </a:stretch>
+        </p:blipFill>
+        <p:spPr>
+          <a:xfrm>
+            <a:off x="3072384" y="4297680"/>
+            <a:ext cx="457200" cy="457200"/>
+          </a:xfrm>
+          <a:prstGeom prst="rect">
+            <a:avLst/>
+          </a:prstGeom>
+        </p:spPr>
+      </p:pic>
+      <p:pic>
+        <p:nvPicPr>
+          <p:cNvPr id="96" name="Graphic 95">
+            <a:extLst>
+              <a:ext uri="{FF2B5EF4-FFF2-40B4-BE49-F238E27FC236}">
+                <a16:creationId xmlns:a16="http://schemas.microsoft.com/office/drawing/2014/main" id="{5654C39D-D966-4782-A388-7327517DF6E8}"/>
+              </a:ext>
+            </a:extLst>
+          </p:cNvPr>
+          <p:cNvPicPr>
+            <a:picLocks noChangeAspect="1"/>
+          </p:cNvPicPr>
+          <p:nvPr/>
+        </p:nvPicPr>
+        <p:blipFill>
+          <a:blip r:embed="rId25">
+            <a:extLst>
+              <a:ext uri="{96DAC541-7B7A-43D3-8B79-37D633B846F1}">
+                <asvg:svgBlip xmlns:asvg="http://schemas.microsoft.com/office/drawing/2016/SVG/main" r:embed="rId26"/>
+              </a:ext>
+            </a:extLst>
+          </a:blip>
+          <a:stretch>
+            <a:fillRect/>
+          </a:stretch>
+        </p:blipFill>
+        <p:spPr>
+          <a:xfrm>
+            <a:off x="5541264" y="4318740"/>
+            <a:ext cx="457200" cy="457200"/>
+          </a:xfrm>
+          <a:prstGeom prst="rect">
+            <a:avLst/>
+          </a:prstGeom>
+        </p:spPr>
+      </p:pic>
+      <p:pic>
+        <p:nvPicPr>
+          <p:cNvPr id="97" name="Graphic 96">
+            <a:extLst>
+              <a:ext uri="{FF2B5EF4-FFF2-40B4-BE49-F238E27FC236}">
+                <a16:creationId xmlns:a16="http://schemas.microsoft.com/office/drawing/2014/main" id="{3A3E1850-264F-4B93-B0BC-8CF798042A30}"/>
+              </a:ext>
+            </a:extLst>
+          </p:cNvPr>
+          <p:cNvPicPr>
+            <a:picLocks noChangeAspect="1"/>
+          </p:cNvPicPr>
+          <p:nvPr/>
+        </p:nvPicPr>
+        <p:blipFill>
+          <a:blip r:embed="rId25">
+            <a:extLst>
+              <a:ext uri="{96DAC541-7B7A-43D3-8B79-37D633B846F1}">
+                <asvg:svgBlip xmlns:asvg="http://schemas.microsoft.com/office/drawing/2016/SVG/main" r:embed="rId26"/>
+              </a:ext>
+            </a:extLst>
+          </a:blip>
+          <a:stretch>
+            <a:fillRect/>
+          </a:stretch>
+        </p:blipFill>
+        <p:spPr>
+          <a:xfrm>
+            <a:off x="9582912" y="4315968"/>
+            <a:ext cx="457200" cy="457200"/>
+          </a:xfrm>
+          <a:prstGeom prst="rect">
+            <a:avLst/>
+          </a:prstGeom>
+        </p:spPr>
+      </p:pic>
     </p:spTree>
   </p:cSld>
   <p:clrMapOvr>

</xml_diff>